<commit_message>
Y1C MS team Teamplate + fair checklist research metholodolgy
</commit_message>
<xml_diff>
--- a/docs/Year1/BlockC/MS Teams Assignment Template/Learning Log -  Y1C_2022-23_ADSAI.pptx
+++ b/docs/Year1/BlockC/MS Teams Assignment Template/Learning Log -  Y1C_2022-23_ADSAI.pptx
@@ -5,7 +5,7 @@
     <p:sldMasterId id="2147483658" r:id="rId4"/>
   </p:sldMasterIdLst>
   <p:notesMasterIdLst>
-    <p:notesMasterId r:id="rId45"/>
+    <p:notesMasterId r:id="rId42"/>
   </p:notesMasterIdLst>
   <p:sldIdLst>
     <p:sldId id="256" r:id="rId5"/>
@@ -38,72 +38,69 @@
     <p:sldId id="294" r:id="rId32"/>
     <p:sldId id="299" r:id="rId33"/>
     <p:sldId id="300" r:id="rId34"/>
-    <p:sldId id="335" r:id="rId35"/>
-    <p:sldId id="302" r:id="rId36"/>
-    <p:sldId id="303" r:id="rId37"/>
-    <p:sldId id="306" r:id="rId38"/>
-    <p:sldId id="307" r:id="rId39"/>
-    <p:sldId id="333" r:id="rId40"/>
-    <p:sldId id="334" r:id="rId41"/>
-    <p:sldId id="296" r:id="rId42"/>
-    <p:sldId id="297" r:id="rId43"/>
-    <p:sldId id="298" r:id="rId44"/>
+    <p:sldId id="302" r:id="rId35"/>
+    <p:sldId id="303" r:id="rId36"/>
+    <p:sldId id="333" r:id="rId37"/>
+    <p:sldId id="334" r:id="rId38"/>
+    <p:sldId id="296" r:id="rId39"/>
+    <p:sldId id="297" r:id="rId40"/>
+    <p:sldId id="298" r:id="rId41"/>
   </p:sldIdLst>
   <p:sldSz cx="9144000" cy="5143500" type="screen16x9"/>
   <p:notesSz cx="6858000" cy="9144000"/>
   <p:embeddedFontLst>
     <p:embeddedFont>
       <p:font typeface="Alfa Slab One" panose="020B0604020202020204" charset="0"/>
-      <p:regular r:id="rId46"/>
+      <p:regular r:id="rId43"/>
     </p:embeddedFont>
     <p:embeddedFont>
       <p:font typeface="Helvetica Neue" panose="020B0604020202020204" charset="0"/>
-      <p:regular r:id="rId47"/>
-      <p:bold r:id="rId48"/>
-      <p:italic r:id="rId49"/>
-      <p:boldItalic r:id="rId50"/>
+      <p:regular r:id="rId44"/>
+      <p:bold r:id="rId45"/>
+      <p:italic r:id="rId46"/>
+      <p:boldItalic r:id="rId47"/>
     </p:embeddedFont>
     <p:embeddedFont>
       <p:font typeface="Open Sans" panose="020B0606030504020204" pitchFamily="34" charset="0"/>
-      <p:regular r:id="rId51"/>
-      <p:bold r:id="rId52"/>
-      <p:italic r:id="rId53"/>
-      <p:boldItalic r:id="rId54"/>
+      <p:regular r:id="rId48"/>
+      <p:bold r:id="rId49"/>
+      <p:italic r:id="rId50"/>
+      <p:boldItalic r:id="rId51"/>
     </p:embeddedFont>
     <p:embeddedFont>
       <p:font typeface="Proxima Nova" panose="020B0604020202020204" charset="0"/>
-      <p:regular r:id="rId55"/>
-      <p:bold r:id="rId56"/>
-      <p:italic r:id="rId57"/>
-      <p:boldItalic r:id="rId58"/>
+      <p:regular r:id="rId52"/>
+      <p:bold r:id="rId53"/>
+      <p:italic r:id="rId54"/>
+      <p:boldItalic r:id="rId55"/>
     </p:embeddedFont>
     <p:embeddedFont>
       <p:font typeface="Roboto" panose="02000000000000000000" pitchFamily="2" charset="0"/>
-      <p:regular r:id="rId59"/>
-      <p:bold r:id="rId60"/>
-      <p:italic r:id="rId61"/>
-      <p:boldItalic r:id="rId62"/>
+      <p:regular r:id="rId56"/>
+      <p:bold r:id="rId57"/>
+      <p:italic r:id="rId58"/>
+      <p:boldItalic r:id="rId59"/>
     </p:embeddedFont>
     <p:embeddedFont>
       <p:font typeface="Roboto Light" panose="02000000000000000000" pitchFamily="2" charset="0"/>
-      <p:regular r:id="rId63"/>
-      <p:bold r:id="rId64"/>
-      <p:italic r:id="rId65"/>
-      <p:boldItalic r:id="rId66"/>
+      <p:regular r:id="rId60"/>
+      <p:bold r:id="rId61"/>
+      <p:italic r:id="rId62"/>
+      <p:boldItalic r:id="rId63"/>
     </p:embeddedFont>
     <p:embeddedFont>
       <p:font typeface="Roboto Thin" panose="02000000000000000000" pitchFamily="2" charset="0"/>
-      <p:regular r:id="rId67"/>
-      <p:bold r:id="rId68"/>
-      <p:italic r:id="rId69"/>
-      <p:boldItalic r:id="rId70"/>
+      <p:regular r:id="rId64"/>
+      <p:bold r:id="rId65"/>
+      <p:italic r:id="rId66"/>
+      <p:boldItalic r:id="rId67"/>
     </p:embeddedFont>
     <p:embeddedFont>
       <p:font typeface="Segoe UI" panose="020B0502040204020203" pitchFamily="34" charset="0"/>
-      <p:regular r:id="rId71"/>
-      <p:bold r:id="rId72"/>
-      <p:italic r:id="rId73"/>
-      <p:boldItalic r:id="rId74"/>
+      <p:regular r:id="rId68"/>
+      <p:bold r:id="rId69"/>
+      <p:italic r:id="rId70"/>
+      <p:boldItalic r:id="rId71"/>
     </p:embeddedFont>
   </p:embeddedFontLst>
   <p:defaultTextStyle>
@@ -3403,7 +3400,7 @@
   <p:cSld>
     <p:spTree>
       <p:nvGrpSpPr>
-        <p:cNvPr id="1" name="Shape 471"/>
+        <p:cNvPr id="1" name="Shape 463"/>
         <p:cNvGrpSpPr/>
         <p:nvPr/>
       </p:nvGrpSpPr>
@@ -3417,7 +3414,7 @@
       </p:grpSpPr>
       <p:sp>
         <p:nvSpPr>
-          <p:cNvPr id="472" name="Google Shape;472;g6b602ea5a7_1_359:notes"/>
+          <p:cNvPr id="464" name="Google Shape;464;g6b4f495656_0_721:notes"/>
           <p:cNvSpPr>
             <a:spLocks noGrp="1" noRot="1" noChangeAspect="1"/>
           </p:cNvSpPr>
@@ -3458,7 +3455,7 @@
       </p:sp>
       <p:sp>
         <p:nvSpPr>
-          <p:cNvPr id="473" name="Google Shape;473;g6b602ea5a7_1_359:notes"/>
+          <p:cNvPr id="465" name="Google Shape;465;g6b4f495656_0_721:notes"/>
           <p:cNvSpPr txBox="1">
             <a:spLocks noGrp="1"/>
           </p:cNvSpPr>
@@ -3497,7 +3494,7 @@
     </p:spTree>
     <p:extLst>
       <p:ext uri="{BB962C8B-B14F-4D97-AF65-F5344CB8AC3E}">
-        <p14:creationId xmlns:p14="http://schemas.microsoft.com/office/powerpoint/2010/main" val="3350136012"/>
+        <p14:creationId xmlns:p14="http://schemas.microsoft.com/office/powerpoint/2010/main" val="2396244362"/>
       </p:ext>
     </p:extLst>
   </p:cSld>
@@ -3512,7 +3509,7 @@
   <p:cSld>
     <p:spTree>
       <p:nvGrpSpPr>
-        <p:cNvPr id="1" name="Shape 463"/>
+        <p:cNvPr id="1" name="Shape 471"/>
         <p:cNvGrpSpPr/>
         <p:nvPr/>
       </p:nvGrpSpPr>
@@ -3526,7 +3523,7 @@
       </p:grpSpPr>
       <p:sp>
         <p:nvSpPr>
-          <p:cNvPr id="464" name="Google Shape;464;g6b4f495656_0_721:notes"/>
+          <p:cNvPr id="472" name="Google Shape;472;g6b602ea5a7_1_359:notes"/>
           <p:cNvSpPr>
             <a:spLocks noGrp="1" noRot="1" noChangeAspect="1"/>
           </p:cNvSpPr>
@@ -3567,7 +3564,7 @@
       </p:sp>
       <p:sp>
         <p:nvSpPr>
-          <p:cNvPr id="465" name="Google Shape;465;g6b4f495656_0_721:notes"/>
+          <p:cNvPr id="473" name="Google Shape;473;g6b602ea5a7_1_359:notes"/>
           <p:cNvSpPr txBox="1">
             <a:spLocks noGrp="1"/>
           </p:cNvSpPr>
@@ -3606,7 +3603,7 @@
     </p:spTree>
     <p:extLst>
       <p:ext uri="{BB962C8B-B14F-4D97-AF65-F5344CB8AC3E}">
-        <p14:creationId xmlns:p14="http://schemas.microsoft.com/office/powerpoint/2010/main" val="2396244362"/>
+        <p14:creationId xmlns:p14="http://schemas.microsoft.com/office/powerpoint/2010/main" val="1287584648"/>
       </p:ext>
     </p:extLst>
   </p:cSld>
@@ -3621,7 +3618,7 @@
   <p:cSld>
     <p:spTree>
       <p:nvGrpSpPr>
-        <p:cNvPr id="1" name="Shape 471"/>
+        <p:cNvPr id="1" name="Shape 463"/>
         <p:cNvGrpSpPr/>
         <p:nvPr/>
       </p:nvGrpSpPr>
@@ -3635,7 +3632,7 @@
       </p:grpSpPr>
       <p:sp>
         <p:nvSpPr>
-          <p:cNvPr id="472" name="Google Shape;472;g6b602ea5a7_1_359:notes"/>
+          <p:cNvPr id="464" name="Google Shape;464;g6b4f495656_0_721:notes"/>
           <p:cNvSpPr>
             <a:spLocks noGrp="1" noRot="1" noChangeAspect="1"/>
           </p:cNvSpPr>
@@ -3676,7 +3673,7 @@
       </p:sp>
       <p:sp>
         <p:nvSpPr>
-          <p:cNvPr id="473" name="Google Shape;473;g6b602ea5a7_1_359:notes"/>
+          <p:cNvPr id="465" name="Google Shape;465;g6b4f495656_0_721:notes"/>
           <p:cNvSpPr txBox="1">
             <a:spLocks noGrp="1"/>
           </p:cNvSpPr>
@@ -3715,7 +3712,7 @@
     </p:spTree>
     <p:extLst>
       <p:ext uri="{BB962C8B-B14F-4D97-AF65-F5344CB8AC3E}">
-        <p14:creationId xmlns:p14="http://schemas.microsoft.com/office/powerpoint/2010/main" val="1287584648"/>
+        <p14:creationId xmlns:p14="http://schemas.microsoft.com/office/powerpoint/2010/main" val="2177648033"/>
       </p:ext>
     </p:extLst>
   </p:cSld>
@@ -3730,7 +3727,7 @@
   <p:cSld>
     <p:spTree>
       <p:nvGrpSpPr>
-        <p:cNvPr id="1" name="Shape 463"/>
+        <p:cNvPr id="1" name="Shape 471"/>
         <p:cNvGrpSpPr/>
         <p:nvPr/>
       </p:nvGrpSpPr>
@@ -3744,7 +3741,7 @@
       </p:grpSpPr>
       <p:sp>
         <p:nvSpPr>
-          <p:cNvPr id="464" name="Google Shape;464;g6b4f495656_0_721:notes"/>
+          <p:cNvPr id="472" name="Google Shape;472;g6b602ea5a7_1_359:notes"/>
           <p:cNvSpPr>
             <a:spLocks noGrp="1" noRot="1" noChangeAspect="1"/>
           </p:cNvSpPr>
@@ -3785,7 +3782,7 @@
       </p:sp>
       <p:sp>
         <p:nvSpPr>
-          <p:cNvPr id="465" name="Google Shape;465;g6b4f495656_0_721:notes"/>
+          <p:cNvPr id="473" name="Google Shape;473;g6b602ea5a7_1_359:notes"/>
           <p:cNvSpPr txBox="1">
             <a:spLocks noGrp="1"/>
           </p:cNvSpPr>
@@ -3824,7 +3821,7 @@
     </p:spTree>
     <p:extLst>
       <p:ext uri="{BB962C8B-B14F-4D97-AF65-F5344CB8AC3E}">
-        <p14:creationId xmlns:p14="http://schemas.microsoft.com/office/powerpoint/2010/main" val="3384878734"/>
+        <p14:creationId xmlns:p14="http://schemas.microsoft.com/office/powerpoint/2010/main" val="700268424"/>
       </p:ext>
     </p:extLst>
   </p:cSld>
@@ -3839,7 +3836,7 @@
   <p:cSld>
     <p:spTree>
       <p:nvGrpSpPr>
-        <p:cNvPr id="1" name="Shape 471"/>
+        <p:cNvPr id="1" name="Shape 493"/>
         <p:cNvGrpSpPr/>
         <p:nvPr/>
       </p:nvGrpSpPr>
@@ -3853,7 +3850,7 @@
       </p:grpSpPr>
       <p:sp>
         <p:nvSpPr>
-          <p:cNvPr id="472" name="Google Shape;472;g6b602ea5a7_1_359:notes"/>
+          <p:cNvPr id="494" name="Google Shape;494;g6b4f495656_0_753:notes"/>
           <p:cNvSpPr>
             <a:spLocks noGrp="1" noRot="1" noChangeAspect="1"/>
           </p:cNvSpPr>
@@ -3894,7 +3891,7 @@
       </p:sp>
       <p:sp>
         <p:nvSpPr>
-          <p:cNvPr id="473" name="Google Shape;473;g6b602ea5a7_1_359:notes"/>
+          <p:cNvPr id="495" name="Google Shape;495;g6b4f495656_0_753:notes"/>
           <p:cNvSpPr txBox="1">
             <a:spLocks noGrp="1"/>
           </p:cNvSpPr>
@@ -3926,16 +3923,31 @@
               </a:spcAft>
               <a:buNone/>
             </a:pPr>
+            <a:r>
+              <a:rPr lang="en"/>
+              <a:t>MUST BE COMPLETED IN WEEK 8</a:t>
+            </a:r>
             <a:endParaRPr/>
           </a:p>
+          <a:p>
+            <a:pPr marL="0" lvl="0" indent="0" algn="l" rtl="0">
+              <a:spcBef>
+                <a:spcPts val="0"/>
+              </a:spcBef>
+              <a:spcAft>
+                <a:spcPts val="0"/>
+              </a:spcAft>
+              <a:buNone/>
+            </a:pPr>
+            <a:r>
+              <a:rPr lang="en"/>
+              <a:t>Summative reflection on your progress during the block including a critical assessment of everything you did and learned during the block. This is a comprehensive review of everything recorded in Section B, evaluated against the goals and planning laid out in Section A.</a:t>
+            </a:r>
+            <a:endParaRPr/>
+          </a:p>
         </p:txBody>
       </p:sp>
     </p:spTree>
-    <p:extLst>
-      <p:ext uri="{BB962C8B-B14F-4D97-AF65-F5344CB8AC3E}">
-        <p14:creationId xmlns:p14="http://schemas.microsoft.com/office/powerpoint/2010/main" val="186889209"/>
-      </p:ext>
-    </p:extLst>
   </p:cSld>
   <p:clrMapOvr>
     <a:masterClrMapping/>
@@ -3948,7 +3960,7 @@
   <p:cSld>
     <p:spTree>
       <p:nvGrpSpPr>
-        <p:cNvPr id="1" name="Shape 463"/>
+        <p:cNvPr id="1" name="Shape 500"/>
         <p:cNvGrpSpPr/>
         <p:nvPr/>
       </p:nvGrpSpPr>
@@ -3962,7 +3974,7 @@
       </p:grpSpPr>
       <p:sp>
         <p:nvSpPr>
-          <p:cNvPr id="464" name="Google Shape;464;g6b4f495656_0_721:notes"/>
+          <p:cNvPr id="501" name="Google Shape;501;g6b602ea5a7_1_212:notes"/>
           <p:cNvSpPr>
             <a:spLocks noGrp="1" noRot="1" noChangeAspect="1"/>
           </p:cNvSpPr>
@@ -4003,7 +4015,7 @@
       </p:sp>
       <p:sp>
         <p:nvSpPr>
-          <p:cNvPr id="465" name="Google Shape;465;g6b4f495656_0_721:notes"/>
+          <p:cNvPr id="502" name="Google Shape;502;g6b602ea5a7_1_212:notes"/>
           <p:cNvSpPr txBox="1">
             <a:spLocks noGrp="1"/>
           </p:cNvSpPr>
@@ -4040,11 +4052,6 @@
         </p:txBody>
       </p:sp>
     </p:spTree>
-    <p:extLst>
-      <p:ext uri="{BB962C8B-B14F-4D97-AF65-F5344CB8AC3E}">
-        <p14:creationId xmlns:p14="http://schemas.microsoft.com/office/powerpoint/2010/main" val="2177648033"/>
-      </p:ext>
-    </p:extLst>
   </p:cSld>
   <p:clrMapOvr>
     <a:masterClrMapping/>
@@ -4057,7 +4064,7 @@
   <p:cSld>
     <p:spTree>
       <p:nvGrpSpPr>
-        <p:cNvPr id="1" name="Shape 471"/>
+        <p:cNvPr id="1" name="Shape 509"/>
         <p:cNvGrpSpPr/>
         <p:nvPr/>
       </p:nvGrpSpPr>
@@ -4071,7 +4078,7 @@
       </p:grpSpPr>
       <p:sp>
         <p:nvSpPr>
-          <p:cNvPr id="472" name="Google Shape;472;g6b602ea5a7_1_359:notes"/>
+          <p:cNvPr id="510" name="Google Shape;510;g6b602ea5a7_1_221:notes"/>
           <p:cNvSpPr>
             <a:spLocks noGrp="1" noRot="1" noChangeAspect="1"/>
           </p:cNvSpPr>
@@ -4112,240 +4119,7 @@
       </p:sp>
       <p:sp>
         <p:nvSpPr>
-          <p:cNvPr id="473" name="Google Shape;473;g6b602ea5a7_1_359:notes"/>
-          <p:cNvSpPr txBox="1">
-            <a:spLocks noGrp="1"/>
-          </p:cNvSpPr>
-          <p:nvPr>
-            <p:ph type="body" idx="1"/>
-          </p:nvPr>
-        </p:nvSpPr>
-        <p:spPr>
-          <a:xfrm>
-            <a:off x="685800" y="4343400"/>
-            <a:ext cx="5486400" cy="4114800"/>
-          </a:xfrm>
-          <a:prstGeom prst="rect">
-            <a:avLst/>
-          </a:prstGeom>
-        </p:spPr>
-        <p:txBody>
-          <a:bodyPr spcFirstLastPara="1" wrap="square" lIns="91425" tIns="91425" rIns="91425" bIns="91425" anchor="t" anchorCtr="0">
-            <a:noAutofit/>
-          </a:bodyPr>
-          <a:lstStyle/>
-          <a:p>
-            <a:pPr marL="0" lvl="0" indent="0" algn="l" rtl="0">
-              <a:spcBef>
-                <a:spcPts val="0"/>
-              </a:spcBef>
-              <a:spcAft>
-                <a:spcPts val="0"/>
-              </a:spcAft>
-              <a:buNone/>
-            </a:pPr>
-            <a:endParaRPr/>
-          </a:p>
-        </p:txBody>
-      </p:sp>
-    </p:spTree>
-    <p:extLst>
-      <p:ext uri="{BB962C8B-B14F-4D97-AF65-F5344CB8AC3E}">
-        <p14:creationId xmlns:p14="http://schemas.microsoft.com/office/powerpoint/2010/main" val="700268424"/>
-      </p:ext>
-    </p:extLst>
-  </p:cSld>
-  <p:clrMapOvr>
-    <a:masterClrMapping/>
-  </p:clrMapOvr>
-</p:notes>
-</file>
-
-<file path=ppt/notesSlides/notesSlide38.xml><?xml version="1.0" encoding="utf-8"?>
-<p:notes xmlns:a="http://schemas.openxmlformats.org/drawingml/2006/main" xmlns:r="http://schemas.openxmlformats.org/officeDocument/2006/relationships" xmlns:p="http://schemas.openxmlformats.org/presentationml/2006/main" showMasterSp="0" showMasterPhAnim="0">
-  <p:cSld>
-    <p:spTree>
-      <p:nvGrpSpPr>
-        <p:cNvPr id="1" name="Shape 493"/>
-        <p:cNvGrpSpPr/>
-        <p:nvPr/>
-      </p:nvGrpSpPr>
-      <p:grpSpPr>
-        <a:xfrm>
-          <a:off x="0" y="0"/>
-          <a:ext cx="0" cy="0"/>
-          <a:chOff x="0" y="0"/>
-          <a:chExt cx="0" cy="0"/>
-        </a:xfrm>
-      </p:grpSpPr>
-      <p:sp>
-        <p:nvSpPr>
-          <p:cNvPr id="494" name="Google Shape;494;g6b4f495656_0_753:notes"/>
-          <p:cNvSpPr>
-            <a:spLocks noGrp="1" noRot="1" noChangeAspect="1"/>
-          </p:cNvSpPr>
-          <p:nvPr>
-            <p:ph type="sldImg" idx="2"/>
-          </p:nvPr>
-        </p:nvSpPr>
-        <p:spPr>
-          <a:xfrm>
-            <a:off x="381000" y="685800"/>
-            <a:ext cx="6096000" cy="3429000"/>
-          </a:xfrm>
-          <a:custGeom>
-            <a:avLst/>
-            <a:gdLst/>
-            <a:ahLst/>
-            <a:cxnLst/>
-            <a:rect l="l" t="t" r="r" b="b"/>
-            <a:pathLst>
-              <a:path w="120000" h="120000" extrusionOk="0">
-                <a:moveTo>
-                  <a:pt x="0" y="0"/>
-                </a:moveTo>
-                <a:lnTo>
-                  <a:pt x="120000" y="0"/>
-                </a:lnTo>
-                <a:lnTo>
-                  <a:pt x="120000" y="120000"/>
-                </a:lnTo>
-                <a:lnTo>
-                  <a:pt x="0" y="120000"/>
-                </a:lnTo>
-                <a:close/>
-              </a:path>
-            </a:pathLst>
-          </a:custGeom>
-        </p:spPr>
-      </p:sp>
-      <p:sp>
-        <p:nvSpPr>
-          <p:cNvPr id="495" name="Google Shape;495;g6b4f495656_0_753:notes"/>
-          <p:cNvSpPr txBox="1">
-            <a:spLocks noGrp="1"/>
-          </p:cNvSpPr>
-          <p:nvPr>
-            <p:ph type="body" idx="1"/>
-          </p:nvPr>
-        </p:nvSpPr>
-        <p:spPr>
-          <a:xfrm>
-            <a:off x="685800" y="4343400"/>
-            <a:ext cx="5486400" cy="4114800"/>
-          </a:xfrm>
-          <a:prstGeom prst="rect">
-            <a:avLst/>
-          </a:prstGeom>
-        </p:spPr>
-        <p:txBody>
-          <a:bodyPr spcFirstLastPara="1" wrap="square" lIns="91425" tIns="91425" rIns="91425" bIns="91425" anchor="t" anchorCtr="0">
-            <a:noAutofit/>
-          </a:bodyPr>
-          <a:lstStyle/>
-          <a:p>
-            <a:pPr marL="0" lvl="0" indent="0" algn="l" rtl="0">
-              <a:spcBef>
-                <a:spcPts val="0"/>
-              </a:spcBef>
-              <a:spcAft>
-                <a:spcPts val="0"/>
-              </a:spcAft>
-              <a:buNone/>
-            </a:pPr>
-            <a:r>
-              <a:rPr lang="en"/>
-              <a:t>MUST BE COMPLETED IN WEEK 8</a:t>
-            </a:r>
-            <a:endParaRPr/>
-          </a:p>
-          <a:p>
-            <a:pPr marL="0" lvl="0" indent="0" algn="l" rtl="0">
-              <a:spcBef>
-                <a:spcPts val="0"/>
-              </a:spcBef>
-              <a:spcAft>
-                <a:spcPts val="0"/>
-              </a:spcAft>
-              <a:buNone/>
-            </a:pPr>
-            <a:r>
-              <a:rPr lang="en"/>
-              <a:t>Summative reflection on your progress during the block including a critical assessment of everything you did and learned during the block. This is a comprehensive review of everything recorded in Section B, evaluated against the goals and planning laid out in Section A.</a:t>
-            </a:r>
-            <a:endParaRPr/>
-          </a:p>
-        </p:txBody>
-      </p:sp>
-    </p:spTree>
-  </p:cSld>
-  <p:clrMapOvr>
-    <a:masterClrMapping/>
-  </p:clrMapOvr>
-</p:notes>
-</file>
-
-<file path=ppt/notesSlides/notesSlide39.xml><?xml version="1.0" encoding="utf-8"?>
-<p:notes xmlns:a="http://schemas.openxmlformats.org/drawingml/2006/main" xmlns:r="http://schemas.openxmlformats.org/officeDocument/2006/relationships" xmlns:p="http://schemas.openxmlformats.org/presentationml/2006/main" showMasterSp="0" showMasterPhAnim="0">
-  <p:cSld>
-    <p:spTree>
-      <p:nvGrpSpPr>
-        <p:cNvPr id="1" name="Shape 500"/>
-        <p:cNvGrpSpPr/>
-        <p:nvPr/>
-      </p:nvGrpSpPr>
-      <p:grpSpPr>
-        <a:xfrm>
-          <a:off x="0" y="0"/>
-          <a:ext cx="0" cy="0"/>
-          <a:chOff x="0" y="0"/>
-          <a:chExt cx="0" cy="0"/>
-        </a:xfrm>
-      </p:grpSpPr>
-      <p:sp>
-        <p:nvSpPr>
-          <p:cNvPr id="501" name="Google Shape;501;g6b602ea5a7_1_212:notes"/>
-          <p:cNvSpPr>
-            <a:spLocks noGrp="1" noRot="1" noChangeAspect="1"/>
-          </p:cNvSpPr>
-          <p:nvPr>
-            <p:ph type="sldImg" idx="2"/>
-          </p:nvPr>
-        </p:nvSpPr>
-        <p:spPr>
-          <a:xfrm>
-            <a:off x="381000" y="685800"/>
-            <a:ext cx="6096000" cy="3429000"/>
-          </a:xfrm>
-          <a:custGeom>
-            <a:avLst/>
-            <a:gdLst/>
-            <a:ahLst/>
-            <a:cxnLst/>
-            <a:rect l="l" t="t" r="r" b="b"/>
-            <a:pathLst>
-              <a:path w="120000" h="120000" extrusionOk="0">
-                <a:moveTo>
-                  <a:pt x="0" y="0"/>
-                </a:moveTo>
-                <a:lnTo>
-                  <a:pt x="120000" y="0"/>
-                </a:lnTo>
-                <a:lnTo>
-                  <a:pt x="120000" y="120000"/>
-                </a:lnTo>
-                <a:lnTo>
-                  <a:pt x="0" y="120000"/>
-                </a:lnTo>
-                <a:close/>
-              </a:path>
-            </a:pathLst>
-          </a:custGeom>
-        </p:spPr>
-      </p:sp>
-      <p:sp>
-        <p:nvSpPr>
-          <p:cNvPr id="502" name="Google Shape;502;g6b602ea5a7_1_212:notes"/>
+          <p:cNvPr id="511" name="Google Shape;511;g6b602ea5a7_1_221:notes"/>
           <p:cNvSpPr txBox="1">
             <a:spLocks noGrp="1"/>
           </p:cNvSpPr>
@@ -4533,110 +4307,6 @@
               <a:rPr lang="en"/>
               <a:t>(Some reflection is almost always a good idea as it provides the foundation for Section C.)</a:t>
             </a:r>
-            <a:endParaRPr/>
-          </a:p>
-        </p:txBody>
-      </p:sp>
-    </p:spTree>
-  </p:cSld>
-  <p:clrMapOvr>
-    <a:masterClrMapping/>
-  </p:clrMapOvr>
-</p:notes>
-</file>
-
-<file path=ppt/notesSlides/notesSlide40.xml><?xml version="1.0" encoding="utf-8"?>
-<p:notes xmlns:a="http://schemas.openxmlformats.org/drawingml/2006/main" xmlns:r="http://schemas.openxmlformats.org/officeDocument/2006/relationships" xmlns:p="http://schemas.openxmlformats.org/presentationml/2006/main" showMasterSp="0" showMasterPhAnim="0">
-  <p:cSld>
-    <p:spTree>
-      <p:nvGrpSpPr>
-        <p:cNvPr id="1" name="Shape 509"/>
-        <p:cNvGrpSpPr/>
-        <p:nvPr/>
-      </p:nvGrpSpPr>
-      <p:grpSpPr>
-        <a:xfrm>
-          <a:off x="0" y="0"/>
-          <a:ext cx="0" cy="0"/>
-          <a:chOff x="0" y="0"/>
-          <a:chExt cx="0" cy="0"/>
-        </a:xfrm>
-      </p:grpSpPr>
-      <p:sp>
-        <p:nvSpPr>
-          <p:cNvPr id="510" name="Google Shape;510;g6b602ea5a7_1_221:notes"/>
-          <p:cNvSpPr>
-            <a:spLocks noGrp="1" noRot="1" noChangeAspect="1"/>
-          </p:cNvSpPr>
-          <p:nvPr>
-            <p:ph type="sldImg" idx="2"/>
-          </p:nvPr>
-        </p:nvSpPr>
-        <p:spPr>
-          <a:xfrm>
-            <a:off x="381000" y="685800"/>
-            <a:ext cx="6096000" cy="3429000"/>
-          </a:xfrm>
-          <a:custGeom>
-            <a:avLst/>
-            <a:gdLst/>
-            <a:ahLst/>
-            <a:cxnLst/>
-            <a:rect l="l" t="t" r="r" b="b"/>
-            <a:pathLst>
-              <a:path w="120000" h="120000" extrusionOk="0">
-                <a:moveTo>
-                  <a:pt x="0" y="0"/>
-                </a:moveTo>
-                <a:lnTo>
-                  <a:pt x="120000" y="0"/>
-                </a:lnTo>
-                <a:lnTo>
-                  <a:pt x="120000" y="120000"/>
-                </a:lnTo>
-                <a:lnTo>
-                  <a:pt x="0" y="120000"/>
-                </a:lnTo>
-                <a:close/>
-              </a:path>
-            </a:pathLst>
-          </a:custGeom>
-        </p:spPr>
-      </p:sp>
-      <p:sp>
-        <p:nvSpPr>
-          <p:cNvPr id="511" name="Google Shape;511;g6b602ea5a7_1_221:notes"/>
-          <p:cNvSpPr txBox="1">
-            <a:spLocks noGrp="1"/>
-          </p:cNvSpPr>
-          <p:nvPr>
-            <p:ph type="body" idx="1"/>
-          </p:nvPr>
-        </p:nvSpPr>
-        <p:spPr>
-          <a:xfrm>
-            <a:off x="685800" y="4343400"/>
-            <a:ext cx="5486400" cy="4114800"/>
-          </a:xfrm>
-          <a:prstGeom prst="rect">
-            <a:avLst/>
-          </a:prstGeom>
-        </p:spPr>
-        <p:txBody>
-          <a:bodyPr spcFirstLastPara="1" wrap="square" lIns="91425" tIns="91425" rIns="91425" bIns="91425" anchor="t" anchorCtr="0">
-            <a:noAutofit/>
-          </a:bodyPr>
-          <a:lstStyle/>
-          <a:p>
-            <a:pPr marL="0" lvl="0" indent="0" algn="l" rtl="0">
-              <a:spcBef>
-                <a:spcPts val="0"/>
-              </a:spcBef>
-              <a:spcAft>
-                <a:spcPts val="0"/>
-              </a:spcAft>
-              <a:buNone/>
-            </a:pPr>
             <a:endParaRPr/>
           </a:p>
         </p:txBody>
@@ -19220,11 +18890,7 @@
             </a:pPr>
             <a:r>
               <a:rPr lang="nl-NL" dirty="0"/>
-              <a:t>Professional </a:t>
-            </a:r>
-            <a:r>
-              <a:rPr lang="nl-NL" dirty="0" err="1"/>
-              <a:t>Practice</a:t>
+              <a:t>Business Understanding</a:t>
             </a:r>
             <a:endParaRPr dirty="0"/>
           </a:p>
@@ -19265,20 +18931,8 @@
               <a:buNone/>
             </a:pPr>
             <a:r>
-              <a:rPr lang="en-GB" dirty="0"/>
-              <a:t>The student demonstrates professional </a:t>
-            </a:r>
-            <a:r>
-              <a:rPr lang="en-GB" dirty="0" err="1"/>
-              <a:t>behavior</a:t>
-            </a:r>
-            <a:r>
-              <a:rPr lang="en-GB" dirty="0"/>
-              <a:t> as well as accountability and ethics in the application of industry best practices for planning, communication, collaboration, and responsible execution of work assignments</a:t>
-            </a:r>
-            <a:r>
-              <a:rPr lang="en-NL" dirty="0"/>
-              <a:t>.</a:t>
+              <a:rPr lang="en-US" dirty="0"/>
+              <a:t>The student is able to generate an idea for an application and identifies a  target market in need of this product as well as  evaluate this idea using a Strengths, Weaknesses, Opportunities and Threats (S.W.O.T.) analysis. </a:t>
             </a:r>
             <a:endParaRPr lang="en" dirty="0"/>
           </a:p>
@@ -19590,20 +19244,8 @@
               <a:buNone/>
             </a:pPr>
             <a:r>
-              <a:rPr lang="en-GB" dirty="0"/>
-              <a:t>The student demonstrates professional </a:t>
-            </a:r>
-            <a:r>
-              <a:rPr lang="en-GB" dirty="0" err="1"/>
-              <a:t>behavior</a:t>
-            </a:r>
-            <a:r>
-              <a:rPr lang="en-GB" dirty="0"/>
-              <a:t> as well as accountability and ethics in the application of industry best practices for planning, communication, collaboration, and responsible execution of work assignments</a:t>
-            </a:r>
-            <a:r>
-              <a:rPr lang="en-NL" dirty="0"/>
-              <a:t>.</a:t>
+              <a:rPr lang="en-US" dirty="0"/>
+              <a:t>The student is able to generate an idea for an application and identifies a  target market in need of this product as well as  evaluate this idea using a Strengths, Weaknesses, Opportunities and Threats (S.W.O.T.) analysis. </a:t>
             </a:r>
             <a:endParaRPr lang="en-GB" dirty="0"/>
           </a:p>
@@ -19648,8 +19290,8 @@
               <a:t>1.</a:t>
             </a:r>
             <a:r>
-              <a:rPr lang="en-NL" dirty="0"/>
-              <a:t>0</a:t>
+              <a:rPr lang="en-US" dirty="0"/>
+              <a:t>1</a:t>
             </a:r>
             <a:endParaRPr dirty="0"/>
           </a:p>
@@ -19691,12 +19333,9 @@
             </a:pPr>
             <a:r>
               <a:rPr lang="en-US" dirty="0"/>
-              <a:t>The student accurately tracks time spent on planned and unplanned work, noting reasons for and consequences of deviations from the planned objectives.</a:t>
-            </a:r>
-            <a:r>
-              <a:rPr lang="en-GB" dirty="0"/>
-              <a:t>	</a:t>
-            </a:r>
+              <a:t>The student is able to generate an idea for an application and identifies a  target market in need of this product as well as  evaluate this idea using a Strengths, Weaknesses, Opportunities and Threats (S.W.O.T.) analysis. </a:t>
+            </a:r>
+            <a:endParaRPr lang="en-GB" dirty="0"/>
           </a:p>
         </p:txBody>
       </p:sp>
@@ -19909,8 +19548,8 @@
               <a:buNone/>
             </a:pPr>
             <a:r>
-              <a:rPr lang="en-GB" dirty="0"/>
-              <a:t>The student demonstrate self-exploration and personal development, good academic practices in learning how to learn and the acquisition of professional knowledge through research, </a:t>
+              <a:rPr lang="en-US" dirty="0"/>
+              <a:t>Demonstrate self-exploration and personal development, good academic practices in learning how to learn and the acquisition of professional knowledge through research, </a:t>
             </a:r>
           </a:p>
           <a:p>
@@ -19924,14 +19563,9 @@
               <a:buNone/>
             </a:pPr>
             <a:r>
-              <a:rPr lang="en-GB" dirty="0"/>
-              <a:t>study, analysis, applied practice, discussion and reporting</a:t>
-            </a:r>
-            <a:r>
-              <a:rPr lang="en-NL" dirty="0"/>
-              <a:t>.</a:t>
-            </a:r>
-            <a:endParaRPr dirty="0"/>
+              <a:rPr lang="en-US" dirty="0"/>
+              <a:t>study, analysis, applied practice, discussion and reporting.</a:t>
+            </a:r>
           </a:p>
         </p:txBody>
       </p:sp>
@@ -20137,17 +19771,10 @@
               <a:buNone/>
             </a:pPr>
             <a:r>
-              <a:rPr lang="en-GB" dirty="0"/>
-              <a:t>The student demonstrate self-exploration and personal development, good academic practices in learning how to learn and the acquisition of professional knowledge through research, </a:t>
-            </a:r>
-            <a:r>
-              <a:rPr lang="en-NL" dirty="0"/>
-              <a:t> </a:t>
-            </a:r>
-            <a:r>
-              <a:rPr lang="en-GB" dirty="0"/>
-              <a:t>study, analysis, applied practice, discussion and reporting.</a:t>
-            </a:r>
+              <a:rPr lang="en-US" dirty="0"/>
+              <a:t>Demonstrate self-exploration and personal development, good academic practices in learning how to learn and the acquisition of professional knowledge through research, study, analysis, applied practice, discussion and reporting.</a:t>
+            </a:r>
+            <a:endParaRPr lang="en-GB" dirty="0"/>
           </a:p>
         </p:txBody>
       </p:sp>
@@ -20190,8 +19817,8 @@
               <a:t>2.</a:t>
             </a:r>
             <a:r>
-              <a:rPr lang="en-NL" dirty="0"/>
-              <a:t>0</a:t>
+              <a:rPr lang="en-US" dirty="0"/>
+              <a:t>2</a:t>
             </a:r>
             <a:endParaRPr dirty="0"/>
           </a:p>
@@ -20233,12 +19860,9 @@
             </a:pPr>
             <a:r>
               <a:rPr lang="en-US" dirty="0"/>
-              <a:t>The student reflects on personal behavior and attitudes, showing critical analysis of key lessons learned and identifying clear action points for improvement.</a:t>
-            </a:r>
-            <a:r>
-              <a:rPr lang="en-GB" dirty="0"/>
-              <a:t>	</a:t>
-            </a:r>
+              <a:t>Regularly engages in self-guided study and self-development, including active engagement in professional learning communities, studying online resources and active participation in (online) communities.	</a:t>
+            </a:r>
+            <a:endParaRPr lang="en-GB" dirty="0"/>
           </a:p>
         </p:txBody>
       </p:sp>
@@ -20497,7 +20121,7 @@
             </a:pPr>
             <a:r>
               <a:rPr lang="en-US" dirty="0"/>
-              <a:t>Data Governance</a:t>
+              <a:t>Responsible AI</a:t>
             </a:r>
           </a:p>
         </p:txBody>
@@ -20538,7 +20162,7 @@
             </a:pPr>
             <a:r>
               <a:rPr lang="en-US" dirty="0"/>
-              <a:t>The student is able to understand and apply appropriate ethical and legal frameworks while working with privacy-sensitive data. 							</a:t>
+              <a:t>The student is able to identify, and describe the limitations of a deep learning based AI algorithm in terms of bias, fairness, transparency, and interpretability, and subsequently apply methods that address these limitations. </a:t>
             </a:r>
           </a:p>
         </p:txBody>
@@ -20854,7 +20478,7 @@
                   <a:srgbClr val="FFFFFF"/>
                 </a:solidFill>
               </a:rPr>
-              <a:t>3.0</a:t>
+              <a:t>3.1</a:t>
             </a:r>
             <a:endParaRPr dirty="0">
               <a:solidFill>
@@ -20900,7 +20524,7 @@
             </a:pPr>
             <a:r>
               <a:rPr lang="en-US" dirty="0"/>
-              <a:t>Students develop a  basic knowledge of ethics and law associated with data and AI.</a:t>
+              <a:t>The student is able to identify, and describe the limitations of a deep learning based AI algorithm in terms of bias, fairness, transparency, and interpretability, and subsequently apply methods that address these limitations. </a:t>
             </a:r>
             <a:endParaRPr lang="en-GB" dirty="0"/>
           </a:p>
@@ -20948,7 +20572,7 @@
             </a:pPr>
             <a:r>
               <a:rPr lang="en-US" dirty="0"/>
-              <a:t>The student is able to understand and apply appropriate ethical and legal frameworks while working with privacy-sensitive data. 			</a:t>
+              <a:t>The student is able to identify, and describe the limitations of a deep learning based AI algorithm in terms of bias, fairness, transparency, and interpretability, and subsequently apply methods that address these limitations. </a:t>
             </a:r>
             <a:endParaRPr lang="en-GB" dirty="0"/>
           </a:p>
@@ -20996,7 +20620,7 @@
             </a:pPr>
             <a:r>
               <a:rPr lang="en-US" sz="1100" dirty="0"/>
-              <a:t>Data Governance</a:t>
+              <a:t>Responsible AI</a:t>
             </a:r>
             <a:endParaRPr sz="1100" dirty="0"/>
           </a:p>
@@ -21105,8 +20729,19 @@
             </a:pPr>
             <a:r>
               <a:rPr lang="en-US" dirty="0"/>
-              <a:t>Data Management and Understanding</a:t>
-            </a:r>
+              <a:t>Neural Networks and Deep Learning</a:t>
+            </a:r>
+          </a:p>
+          <a:p>
+            <a:pPr marL="0" lvl="0" indent="0" algn="ctr" rtl="0">
+              <a:spcBef>
+                <a:spcPts val="0"/>
+              </a:spcBef>
+              <a:spcAft>
+                <a:spcPts val="0"/>
+              </a:spcAft>
+              <a:buNone/>
+            </a:pPr>
             <a:endParaRPr dirty="0"/>
           </a:p>
         </p:txBody>
@@ -21147,7 +20782,7 @@
             </a:pPr>
             <a:r>
               <a:rPr lang="en-US" dirty="0"/>
-              <a:t>Students develop a basic understanding of python programming concepts and are able to collect, clean, and explore data using industry standard libraries.</a:t>
+              <a:t>The student is able to describe different types of feed-forward artificial neural network (ANN) architectures for both supervised and unsupervised learning, and can design and implement them to classify an image.</a:t>
             </a:r>
             <a:endParaRPr dirty="0"/>
           </a:p>
@@ -22018,7 +21653,7 @@
             </a:pPr>
             <a:r>
               <a:rPr lang="en-US" dirty="0"/>
-              <a:t>Students are able to demonstrate a basic understanding of python programming concepts, data types and data structures. 	</a:t>
+              <a:t>The student is able to describe different types of feed-forward artificial neural network (ANN) architectures for both supervised and unsupervised learning, and can design and implement them to classify an image.</a:t>
             </a:r>
           </a:p>
         </p:txBody>
@@ -22065,7 +21700,7 @@
             </a:pPr>
             <a:r>
               <a:rPr lang="en-US" dirty="0"/>
-              <a:t>Students develop a basic understanding of python programming concepts and are able to collect, clean, and explore data using industry standard libraries.</a:t>
+              <a:t>The student is able to describe different types of feed-forward artificial neural network (ANN) architectures for both supervised and unsupervised learning, and can design and implement them to classify an image.</a:t>
             </a:r>
             <a:endParaRPr lang="en-GB" dirty="0"/>
           </a:p>
@@ -22102,18 +21737,10 @@
           </a:bodyPr>
           <a:lstStyle/>
           <a:p>
-            <a:pPr marL="0" lvl="0" indent="0" algn="l" rtl="0">
-              <a:spcBef>
-                <a:spcPts val="0"/>
-              </a:spcBef>
-              <a:spcAft>
-                <a:spcPts val="0"/>
-              </a:spcAft>
-              <a:buNone/>
-            </a:pPr>
+            <a:pPr lvl="0"/>
             <a:r>
               <a:rPr lang="en-US" sz="1100" dirty="0"/>
-              <a:t>Data Management and Understanding</a:t>
+              <a:t>Neural Networks and Deep Learning</a:t>
             </a:r>
           </a:p>
         </p:txBody>
@@ -22136,414 +21763,6 @@
   <p:cSld>
     <p:spTree>
       <p:nvGrpSpPr>
-        <p:cNvPr id="1" name="Shape 474"/>
-        <p:cNvGrpSpPr/>
-        <p:nvPr/>
-      </p:nvGrpSpPr>
-      <p:grpSpPr>
-        <a:xfrm>
-          <a:off x="0" y="0"/>
-          <a:ext cx="0" cy="0"/>
-          <a:chOff x="0" y="0"/>
-          <a:chExt cx="0" cy="0"/>
-        </a:xfrm>
-      </p:grpSpPr>
-      <p:sp>
-        <p:nvSpPr>
-          <p:cNvPr id="475" name="Google Shape;475;p50"/>
-          <p:cNvSpPr txBox="1">
-            <a:spLocks noGrp="1"/>
-          </p:cNvSpPr>
-          <p:nvPr>
-            <p:ph type="title"/>
-          </p:nvPr>
-        </p:nvSpPr>
-        <p:spPr>
-          <a:xfrm>
-            <a:off x="68250" y="0"/>
-            <a:ext cx="777300" cy="576000"/>
-          </a:xfrm>
-          <a:prstGeom prst="rect">
-            <a:avLst/>
-          </a:prstGeom>
-        </p:spPr>
-        <p:txBody>
-          <a:bodyPr spcFirstLastPara="1" wrap="square" lIns="91425" tIns="91425" rIns="91425" bIns="91425" anchor="ctr" anchorCtr="0">
-            <a:noAutofit/>
-          </a:bodyPr>
-          <a:lstStyle/>
-          <a:p>
-            <a:pPr marL="0" lvl="0" indent="0" algn="l" rtl="0">
-              <a:spcBef>
-                <a:spcPts val="0"/>
-              </a:spcBef>
-              <a:spcAft>
-                <a:spcPts val="0"/>
-              </a:spcAft>
-              <a:buNone/>
-            </a:pPr>
-            <a:r>
-              <a:rPr lang="en"/>
-              <a:t>ILO 4</a:t>
-            </a:r>
-            <a:endParaRPr/>
-          </a:p>
-        </p:txBody>
-      </p:sp>
-      <p:sp>
-        <p:nvSpPr>
-          <p:cNvPr id="476" name="Google Shape;476;p50"/>
-          <p:cNvSpPr txBox="1">
-            <a:spLocks noGrp="1"/>
-          </p:cNvSpPr>
-          <p:nvPr>
-            <p:ph type="title" idx="2"/>
-          </p:nvPr>
-        </p:nvSpPr>
-        <p:spPr>
-          <a:xfrm>
-            <a:off x="7068300" y="0"/>
-            <a:ext cx="1984200" cy="576000"/>
-          </a:xfrm>
-          <a:prstGeom prst="rect">
-            <a:avLst/>
-          </a:prstGeom>
-        </p:spPr>
-        <p:txBody>
-          <a:bodyPr spcFirstLastPara="1" wrap="square" lIns="91425" tIns="91425" rIns="91425" bIns="91425" anchor="b" anchorCtr="0">
-            <a:noAutofit/>
-          </a:bodyPr>
-          <a:lstStyle/>
-          <a:p>
-            <a:pPr marL="0" lvl="0" indent="0" algn="r" rtl="0">
-              <a:spcBef>
-                <a:spcPts val="0"/>
-              </a:spcBef>
-              <a:spcAft>
-                <a:spcPts val="0"/>
-              </a:spcAft>
-              <a:buNone/>
-            </a:pPr>
-            <a:r>
-              <a:rPr lang="en" dirty="0"/>
-              <a:t>5/7</a:t>
-            </a:r>
-            <a:endParaRPr dirty="0"/>
-          </a:p>
-        </p:txBody>
-      </p:sp>
-      <p:sp>
-        <p:nvSpPr>
-          <p:cNvPr id="477" name="Google Shape;477;p50"/>
-          <p:cNvSpPr txBox="1">
-            <a:spLocks noGrp="1"/>
-          </p:cNvSpPr>
-          <p:nvPr>
-            <p:ph type="body" idx="1"/>
-          </p:nvPr>
-        </p:nvSpPr>
-        <p:spPr>
-          <a:xfrm>
-            <a:off x="182880" y="1069848"/>
-            <a:ext cx="5486400" cy="3895200"/>
-          </a:xfrm>
-          <a:prstGeom prst="rect">
-            <a:avLst/>
-          </a:prstGeom>
-        </p:spPr>
-        <p:txBody>
-          <a:bodyPr spcFirstLastPara="1" wrap="square" lIns="91425" tIns="91425" rIns="91425" bIns="91425" anchor="t" anchorCtr="0">
-            <a:noAutofit/>
-          </a:bodyPr>
-          <a:lstStyle/>
-          <a:p>
-            <a:pPr marL="0" lvl="0" indent="0" algn="l" rtl="0">
-              <a:lnSpc>
-                <a:spcPct val="115000"/>
-              </a:lnSpc>
-              <a:spcBef>
-                <a:spcPts val="0"/>
-              </a:spcBef>
-              <a:spcAft>
-                <a:spcPts val="0"/>
-              </a:spcAft>
-              <a:buNone/>
-            </a:pPr>
-            <a:r>
-              <a:rPr lang="en-US" sz="900" i="1" dirty="0">
-                <a:solidFill>
-                  <a:schemeClr val="lt1"/>
-                </a:solidFill>
-                <a:latin typeface="Helvetica Neue"/>
-                <a:ea typeface="Helvetica Neue"/>
-                <a:cs typeface="Helvetica Neue"/>
-                <a:sym typeface="Helvetica Neue"/>
-              </a:rPr>
-              <a:t>Show </a:t>
-            </a:r>
-            <a:r>
-              <a:rPr lang="en-US" sz="900" b="1" i="1" dirty="0">
-                <a:solidFill>
-                  <a:schemeClr val="lt1"/>
-                </a:solidFill>
-                <a:latin typeface="Helvetica Neue"/>
-                <a:ea typeface="Helvetica Neue"/>
-                <a:cs typeface="Helvetica Neue"/>
-                <a:sym typeface="Helvetica Neue"/>
-              </a:rPr>
-              <a:t>using links to GitHub </a:t>
-            </a:r>
-            <a:r>
-              <a:rPr lang="en-US" sz="900" i="1" dirty="0">
-                <a:solidFill>
-                  <a:schemeClr val="lt1"/>
-                </a:solidFill>
-                <a:latin typeface="Helvetica Neue"/>
-                <a:ea typeface="Helvetica Neue"/>
-                <a:cs typeface="Helvetica Neue"/>
-                <a:sym typeface="Helvetica Neue"/>
-              </a:rPr>
-              <a:t>your best examples, do not go overboard, add in short description, you are free to alter this layout (or add slides per evidence) to suit your needs. Just be sure that it is clear.</a:t>
-            </a:r>
-            <a:endParaRPr lang="en-US" sz="900" dirty="0">
-              <a:solidFill>
-                <a:schemeClr val="lt1"/>
-              </a:solidFill>
-            </a:endParaRPr>
-          </a:p>
-          <a:p>
-            <a:pPr marL="0" lvl="0" indent="0" algn="l" rtl="0">
-              <a:lnSpc>
-                <a:spcPct val="115000"/>
-              </a:lnSpc>
-              <a:spcBef>
-                <a:spcPts val="0"/>
-              </a:spcBef>
-              <a:spcAft>
-                <a:spcPts val="0"/>
-              </a:spcAft>
-              <a:buNone/>
-            </a:pPr>
-            <a:endParaRPr lang="en-US" sz="700" i="1" dirty="0">
-              <a:solidFill>
-                <a:schemeClr val="lt1"/>
-              </a:solidFill>
-              <a:latin typeface="Helvetica Neue"/>
-              <a:ea typeface="Helvetica Neue"/>
-              <a:cs typeface="Helvetica Neue"/>
-              <a:sym typeface="Helvetica Neue"/>
-            </a:endParaRPr>
-          </a:p>
-        </p:txBody>
-      </p:sp>
-      <p:sp>
-        <p:nvSpPr>
-          <p:cNvPr id="479" name="Google Shape;479;p50"/>
-          <p:cNvSpPr txBox="1">
-            <a:spLocks noGrp="1"/>
-          </p:cNvSpPr>
-          <p:nvPr>
-            <p:ph type="title" idx="4"/>
-          </p:nvPr>
-        </p:nvSpPr>
-        <p:spPr>
-          <a:xfrm>
-            <a:off x="68250" y="576000"/>
-            <a:ext cx="839700" cy="493800"/>
-          </a:xfrm>
-          <a:prstGeom prst="rect">
-            <a:avLst/>
-          </a:prstGeom>
-        </p:spPr>
-        <p:txBody>
-          <a:bodyPr spcFirstLastPara="1" wrap="square" lIns="91425" tIns="91425" rIns="91425" bIns="91425" anchor="ctr" anchorCtr="0">
-            <a:noAutofit/>
-          </a:bodyPr>
-          <a:lstStyle/>
-          <a:p>
-            <a:pPr marL="0" lvl="0" indent="0" algn="l" rtl="0">
-              <a:spcBef>
-                <a:spcPts val="0"/>
-              </a:spcBef>
-              <a:spcAft>
-                <a:spcPts val="0"/>
-              </a:spcAft>
-              <a:buNone/>
-            </a:pPr>
-            <a:r>
-              <a:rPr lang="en" dirty="0"/>
-              <a:t>4</a:t>
-            </a:r>
-            <a:r>
-              <a:rPr lang="en" dirty="0">
-                <a:solidFill>
-                  <a:srgbClr val="FFFFFF"/>
-                </a:solidFill>
-              </a:rPr>
-              <a:t>.2</a:t>
-            </a:r>
-            <a:endParaRPr dirty="0">
-              <a:solidFill>
-                <a:srgbClr val="FFFFFF"/>
-              </a:solidFill>
-            </a:endParaRPr>
-          </a:p>
-        </p:txBody>
-      </p:sp>
-      <p:sp>
-        <p:nvSpPr>
-          <p:cNvPr id="480" name="Google Shape;480;p50"/>
-          <p:cNvSpPr txBox="1">
-            <a:spLocks noGrp="1"/>
-          </p:cNvSpPr>
-          <p:nvPr>
-            <p:ph type="title" idx="5"/>
-          </p:nvPr>
-        </p:nvSpPr>
-        <p:spPr>
-          <a:xfrm>
-            <a:off x="845550" y="576000"/>
-            <a:ext cx="7315200" cy="493800"/>
-          </a:xfrm>
-          <a:prstGeom prst="rect">
-            <a:avLst/>
-          </a:prstGeom>
-        </p:spPr>
-        <p:txBody>
-          <a:bodyPr spcFirstLastPara="1" wrap="square" lIns="91425" tIns="91425" rIns="91425" bIns="91425" anchor="ctr" anchorCtr="0">
-            <a:noAutofit/>
-          </a:bodyPr>
-          <a:lstStyle/>
-          <a:p>
-            <a:pPr marL="0" lvl="0" indent="0" algn="l" rtl="0">
-              <a:spcBef>
-                <a:spcPts val="0"/>
-              </a:spcBef>
-              <a:spcAft>
-                <a:spcPts val="0"/>
-              </a:spcAft>
-              <a:buNone/>
-            </a:pPr>
-            <a:r>
-              <a:rPr lang="en-US" dirty="0"/>
-              <a:t>Students are able to collect, clean, and explore data using industry standard Python libraries.	</a:t>
-            </a:r>
-          </a:p>
-        </p:txBody>
-      </p:sp>
-      <p:sp>
-        <p:nvSpPr>
-          <p:cNvPr id="7" name="Google Shape;459;p48">
-            <a:extLst>
-              <a:ext uri="{FF2B5EF4-FFF2-40B4-BE49-F238E27FC236}">
-                <a16:creationId xmlns:a16="http://schemas.microsoft.com/office/drawing/2014/main" id="{53BB9E1B-97C5-2DA9-6DD8-8B90626EFB7C}"/>
-              </a:ext>
-            </a:extLst>
-          </p:cNvPr>
-          <p:cNvSpPr txBox="1">
-            <a:spLocks noGrp="1"/>
-          </p:cNvSpPr>
-          <p:nvPr>
-            <p:ph type="title" idx="3"/>
-          </p:nvPr>
-        </p:nvSpPr>
-        <p:spPr>
-          <a:xfrm>
-            <a:off x="2049462" y="0"/>
-            <a:ext cx="4206300" cy="576000"/>
-          </a:xfrm>
-          <a:prstGeom prst="rect">
-            <a:avLst/>
-          </a:prstGeom>
-        </p:spPr>
-        <p:txBody>
-          <a:bodyPr spcFirstLastPara="1" wrap="square" lIns="91425" tIns="91425" rIns="91425" bIns="91425" anchor="ctr" anchorCtr="0">
-            <a:noAutofit/>
-          </a:bodyPr>
-          <a:lstStyle/>
-          <a:p>
-            <a:pPr marL="0" lvl="0" indent="0" algn="l" rtl="0">
-              <a:spcBef>
-                <a:spcPts val="0"/>
-              </a:spcBef>
-              <a:spcAft>
-                <a:spcPts val="0"/>
-              </a:spcAft>
-              <a:buNone/>
-            </a:pPr>
-            <a:r>
-              <a:rPr lang="en-US" dirty="0"/>
-              <a:t>Students develop a basic understanding of python programming concepts and are able to collect, clean, and explore data using industry standard libraries.</a:t>
-            </a:r>
-            <a:endParaRPr lang="en-GB" dirty="0"/>
-          </a:p>
-        </p:txBody>
-      </p:sp>
-      <p:sp>
-        <p:nvSpPr>
-          <p:cNvPr id="2" name="Google Shape;462;p48">
-            <a:extLst>
-              <a:ext uri="{FF2B5EF4-FFF2-40B4-BE49-F238E27FC236}">
-                <a16:creationId xmlns:a16="http://schemas.microsoft.com/office/drawing/2014/main" id="{0DF68E2A-4FDB-D5FA-06F1-F3DB970B9CD1}"/>
-              </a:ext>
-            </a:extLst>
-          </p:cNvPr>
-          <p:cNvSpPr txBox="1">
-            <a:spLocks noGrp="1"/>
-          </p:cNvSpPr>
-          <p:nvPr>
-            <p:ph type="title" idx="6"/>
-          </p:nvPr>
-        </p:nvSpPr>
-        <p:spPr>
-          <a:xfrm>
-            <a:off x="845550" y="0"/>
-            <a:ext cx="1368600" cy="576000"/>
-          </a:xfrm>
-          <a:prstGeom prst="rect">
-            <a:avLst/>
-          </a:prstGeom>
-        </p:spPr>
-        <p:txBody>
-          <a:bodyPr spcFirstLastPara="1" wrap="square" lIns="91425" tIns="91425" rIns="91425" bIns="91425" anchor="ctr" anchorCtr="0">
-            <a:noAutofit/>
-          </a:bodyPr>
-          <a:lstStyle/>
-          <a:p>
-            <a:pPr marL="0" lvl="0" indent="0" algn="l" rtl="0">
-              <a:spcBef>
-                <a:spcPts val="0"/>
-              </a:spcBef>
-              <a:spcAft>
-                <a:spcPts val="0"/>
-              </a:spcAft>
-              <a:buNone/>
-            </a:pPr>
-            <a:r>
-              <a:rPr lang="en-US" sz="1100" dirty="0"/>
-              <a:t>Data Management and Understanding</a:t>
-            </a:r>
-          </a:p>
-        </p:txBody>
-      </p:sp>
-    </p:spTree>
-    <p:extLst>
-      <p:ext uri="{BB962C8B-B14F-4D97-AF65-F5344CB8AC3E}">
-        <p14:creationId xmlns:p14="http://schemas.microsoft.com/office/powerpoint/2010/main" val="46958481"/>
-      </p:ext>
-    </p:extLst>
-  </p:cSld>
-  <p:clrMapOvr>
-    <a:masterClrMapping/>
-  </p:clrMapOvr>
-</p:sld>
-</file>
-
-<file path=ppt/slides/slide32.xml><?xml version="1.0" encoding="utf-8"?>
-<p:sld xmlns:a="http://schemas.openxmlformats.org/drawingml/2006/main" xmlns:r="http://schemas.openxmlformats.org/officeDocument/2006/relationships" xmlns:p="http://schemas.openxmlformats.org/presentationml/2006/main">
-  <p:cSld>
-    <p:spTree>
-      <p:nvGrpSpPr>
         <p:cNvPr id="1" name="Shape 466"/>
         <p:cNvGrpSpPr/>
         <p:nvPr/>
@@ -22633,8 +21852,8 @@
               <a:buNone/>
             </a:pPr>
             <a:r>
-              <a:rPr lang="en-GB" dirty="0"/>
-              <a:t>Data Analysis</a:t>
+              <a:rPr lang="en-US" dirty="0"/>
+              <a:t>Human-Centered AI</a:t>
             </a:r>
             <a:endParaRPr dirty="0"/>
           </a:p>
@@ -22753,7 +21972,7 @@
 </p:sld>
 </file>
 
-<file path=ppt/slides/slide33.xml><?xml version="1.0" encoding="utf-8"?>
+<file path=ppt/slides/slide32.xml><?xml version="1.0" encoding="utf-8"?>
 <p:sld xmlns:a="http://schemas.openxmlformats.org/drawingml/2006/main" xmlns:r="http://schemas.openxmlformats.org/officeDocument/2006/relationships" xmlns:p="http://schemas.openxmlformats.org/presentationml/2006/main">
   <p:cSld>
     <p:spTree>
@@ -23001,12 +22220,8 @@
               <a:t>5.</a:t>
             </a:r>
             <a:r>
-              <a:rPr lang="en-NL" dirty="0">
-                <a:solidFill>
-                  <a:srgbClr val="FFFFFF"/>
-                </a:solidFill>
-              </a:rPr>
-              <a:t>0</a:t>
+              <a:rPr lang="en-US" dirty="0"/>
+              <a:t>1</a:t>
             </a:r>
             <a:endParaRPr dirty="0">
               <a:solidFill>
@@ -23052,7 +22267,7 @@
             </a:pPr>
             <a:r>
               <a:rPr lang="en-US" dirty="0"/>
-              <a:t>The student is able to understand different types of supervised and unsupervised machine learning algorithms for data analysis and can implement these to solve a business objective using industry standard Python libraries.  	</a:t>
+              <a:t>The student is able to design and develop a prototype of an application which embeds their own analyses and algorithms.</a:t>
             </a:r>
           </a:p>
         </p:txBody>
@@ -23099,7 +22314,7 @@
             </a:pPr>
             <a:r>
               <a:rPr lang="en-US" dirty="0"/>
-              <a:t>The student is able to understand different types of supervised and unsupervised machine learning algorithms for data analysis and can implement these to solve a business objective using industry standard Python libraries.</a:t>
+              <a:t>The student is able to design and develop a prototype of an application which embeds their own analyses and algorithms.</a:t>
             </a:r>
             <a:endParaRPr lang="en-GB" dirty="0"/>
           </a:p>
@@ -23146,10 +22361,9 @@
               <a:buNone/>
             </a:pPr>
             <a:r>
-              <a:rPr lang="en-GB" sz="1050" dirty="0"/>
-              <a:t>Data Analysis</a:t>
-            </a:r>
-            <a:endParaRPr lang="en-US" sz="1050" dirty="0"/>
+              <a:rPr lang="en-US" sz="1050" dirty="0"/>
+              <a:t>Human-Centered AI</a:t>
+            </a:r>
           </a:p>
         </p:txBody>
       </p:sp>
@@ -23166,645 +22380,7 @@
 </p:sld>
 </file>
 
-<file path=ppt/slides/slide34.xml><?xml version="1.0" encoding="utf-8"?>
-<p:sld xmlns:a="http://schemas.openxmlformats.org/drawingml/2006/main" xmlns:r="http://schemas.openxmlformats.org/officeDocument/2006/relationships" xmlns:p="http://schemas.openxmlformats.org/presentationml/2006/main">
-  <p:cSld>
-    <p:spTree>
-      <p:nvGrpSpPr>
-        <p:cNvPr id="1" name="Shape 466"/>
-        <p:cNvGrpSpPr/>
-        <p:nvPr/>
-      </p:nvGrpSpPr>
-      <p:grpSpPr>
-        <a:xfrm>
-          <a:off x="0" y="0"/>
-          <a:ext cx="0" cy="0"/>
-          <a:chOff x="0" y="0"/>
-          <a:chExt cx="0" cy="0"/>
-        </a:xfrm>
-      </p:grpSpPr>
-      <p:sp>
-        <p:nvSpPr>
-          <p:cNvPr id="467" name="Google Shape;467;p49"/>
-          <p:cNvSpPr txBox="1">
-            <a:spLocks noGrp="1"/>
-          </p:cNvSpPr>
-          <p:nvPr>
-            <p:ph type="ctrTitle"/>
-          </p:nvPr>
-        </p:nvSpPr>
-        <p:spPr>
-          <a:xfrm>
-            <a:off x="2286000" y="1104139"/>
-            <a:ext cx="6400800" cy="1501800"/>
-          </a:xfrm>
-          <a:prstGeom prst="rect">
-            <a:avLst/>
-          </a:prstGeom>
-        </p:spPr>
-        <p:txBody>
-          <a:bodyPr spcFirstLastPara="1" wrap="square" lIns="91425" tIns="91425" rIns="91425" bIns="91425" anchor="ctr" anchorCtr="0">
-            <a:noAutofit/>
-          </a:bodyPr>
-          <a:lstStyle/>
-          <a:p>
-            <a:pPr marL="0" lvl="0" indent="0" algn="ctr" rtl="0">
-              <a:spcBef>
-                <a:spcPts val="0"/>
-              </a:spcBef>
-              <a:spcAft>
-                <a:spcPts val="0"/>
-              </a:spcAft>
-              <a:buNone/>
-            </a:pPr>
-            <a:r>
-              <a:rPr lang="en" dirty="0"/>
-              <a:t>ILO </a:t>
-            </a:r>
-            <a:r>
-              <a:rPr lang="en-NL" dirty="0"/>
-              <a:t>6</a:t>
-            </a:r>
-            <a:endParaRPr dirty="0"/>
-          </a:p>
-        </p:txBody>
-      </p:sp>
-      <p:sp>
-        <p:nvSpPr>
-          <p:cNvPr id="468" name="Google Shape;468;p49"/>
-          <p:cNvSpPr txBox="1">
-            <a:spLocks noGrp="1"/>
-          </p:cNvSpPr>
-          <p:nvPr>
-            <p:ph type="subTitle" idx="1"/>
-          </p:nvPr>
-        </p:nvSpPr>
-        <p:spPr>
-          <a:xfrm>
-            <a:off x="2286000" y="2503171"/>
-            <a:ext cx="6400800" cy="685800"/>
-          </a:xfrm>
-          <a:prstGeom prst="rect">
-            <a:avLst/>
-          </a:prstGeom>
-        </p:spPr>
-        <p:txBody>
-          <a:bodyPr spcFirstLastPara="1" wrap="square" lIns="91425" tIns="91425" rIns="91425" bIns="91425" anchor="ctr" anchorCtr="0">
-            <a:noAutofit/>
-          </a:bodyPr>
-          <a:lstStyle/>
-          <a:p>
-            <a:pPr marL="0" lvl="0" indent="0" algn="ctr" rtl="0">
-              <a:spcBef>
-                <a:spcPts val="0"/>
-              </a:spcBef>
-              <a:spcAft>
-                <a:spcPts val="0"/>
-              </a:spcAft>
-              <a:buNone/>
-            </a:pPr>
-            <a:r>
-              <a:rPr lang="en-US" dirty="0"/>
-              <a:t>Reporting</a:t>
-            </a:r>
-            <a:endParaRPr dirty="0"/>
-          </a:p>
-        </p:txBody>
-      </p:sp>
-      <p:sp>
-        <p:nvSpPr>
-          <p:cNvPr id="469" name="Google Shape;469;p49"/>
-          <p:cNvSpPr txBox="1">
-            <a:spLocks noGrp="1"/>
-          </p:cNvSpPr>
-          <p:nvPr>
-            <p:ph type="subTitle" idx="2"/>
-          </p:nvPr>
-        </p:nvSpPr>
-        <p:spPr>
-          <a:xfrm>
-            <a:off x="3200400" y="3353563"/>
-            <a:ext cx="5486400" cy="685800"/>
-          </a:xfrm>
-          <a:prstGeom prst="rect">
-            <a:avLst/>
-          </a:prstGeom>
-        </p:spPr>
-        <p:txBody>
-          <a:bodyPr spcFirstLastPara="1" wrap="square" lIns="91425" tIns="91425" rIns="91425" bIns="91425" anchor="ctr" anchorCtr="0">
-            <a:noAutofit/>
-          </a:bodyPr>
-          <a:lstStyle/>
-          <a:p>
-            <a:pPr marL="0" lvl="0" indent="0" algn="r" rtl="0">
-              <a:spcBef>
-                <a:spcPts val="0"/>
-              </a:spcBef>
-              <a:spcAft>
-                <a:spcPts val="0"/>
-              </a:spcAft>
-              <a:buNone/>
-            </a:pPr>
-            <a:r>
-              <a:rPr lang="en-US" dirty="0"/>
-              <a:t>The student is able to communicate technical concepts by means of a structured, coherent, and well-formatted professional report.</a:t>
-            </a:r>
-            <a:endParaRPr dirty="0"/>
-          </a:p>
-        </p:txBody>
-      </p:sp>
-      <p:sp>
-        <p:nvSpPr>
-          <p:cNvPr id="470" name="Google Shape;470;p49"/>
-          <p:cNvSpPr txBox="1"/>
-          <p:nvPr/>
-        </p:nvSpPr>
-        <p:spPr>
-          <a:xfrm>
-            <a:off x="-420624" y="749808"/>
-            <a:ext cx="3383400" cy="5120700"/>
-          </a:xfrm>
-          <a:prstGeom prst="rect">
-            <a:avLst/>
-          </a:prstGeom>
-          <a:noFill/>
-          <a:ln>
-            <a:noFill/>
-          </a:ln>
-        </p:spPr>
-        <p:txBody>
-          <a:bodyPr spcFirstLastPara="1" wrap="square" lIns="0" tIns="0" rIns="0" bIns="0" anchor="ctr" anchorCtr="0">
-            <a:noAutofit/>
-          </a:bodyPr>
-          <a:lstStyle/>
-          <a:p>
-            <a:pPr marL="0" lvl="0" indent="0" algn="l" rtl="0">
-              <a:spcBef>
-                <a:spcPts val="0"/>
-              </a:spcBef>
-              <a:spcAft>
-                <a:spcPts val="0"/>
-              </a:spcAft>
-              <a:buNone/>
-            </a:pPr>
-            <a:r>
-              <a:rPr lang="en-NL" sz="40000" dirty="0">
-                <a:solidFill>
-                  <a:srgbClr val="999999"/>
-                </a:solidFill>
-                <a:latin typeface="Roboto"/>
-                <a:ea typeface="Roboto"/>
-                <a:cs typeface="Roboto"/>
-                <a:sym typeface="Roboto"/>
-              </a:rPr>
-              <a:t>6</a:t>
-            </a:r>
-            <a:endParaRPr sz="40000" dirty="0">
-              <a:solidFill>
-                <a:srgbClr val="999999"/>
-              </a:solidFill>
-              <a:latin typeface="Roboto"/>
-              <a:ea typeface="Roboto"/>
-              <a:cs typeface="Roboto"/>
-              <a:sym typeface="Roboto"/>
-            </a:endParaRPr>
-          </a:p>
-        </p:txBody>
-      </p:sp>
-    </p:spTree>
-    <p:extLst>
-      <p:ext uri="{BB962C8B-B14F-4D97-AF65-F5344CB8AC3E}">
-        <p14:creationId xmlns:p14="http://schemas.microsoft.com/office/powerpoint/2010/main" val="2218588203"/>
-      </p:ext>
-    </p:extLst>
-  </p:cSld>
-  <p:clrMapOvr>
-    <a:masterClrMapping/>
-  </p:clrMapOvr>
-</p:sld>
-</file>
-
-<file path=ppt/slides/slide35.xml><?xml version="1.0" encoding="utf-8"?>
-<p:sld xmlns:a="http://schemas.openxmlformats.org/drawingml/2006/main" xmlns:r="http://schemas.openxmlformats.org/officeDocument/2006/relationships" xmlns:p="http://schemas.openxmlformats.org/presentationml/2006/main">
-  <p:cSld>
-    <p:spTree>
-      <p:nvGrpSpPr>
-        <p:cNvPr id="1" name="Shape 474"/>
-        <p:cNvGrpSpPr/>
-        <p:nvPr/>
-      </p:nvGrpSpPr>
-      <p:grpSpPr>
-        <a:xfrm>
-          <a:off x="0" y="0"/>
-          <a:ext cx="0" cy="0"/>
-          <a:chOff x="0" y="0"/>
-          <a:chExt cx="0" cy="0"/>
-        </a:xfrm>
-      </p:grpSpPr>
-      <p:sp>
-        <p:nvSpPr>
-          <p:cNvPr id="475" name="Google Shape;475;p50"/>
-          <p:cNvSpPr txBox="1">
-            <a:spLocks noGrp="1"/>
-          </p:cNvSpPr>
-          <p:nvPr>
-            <p:ph type="title"/>
-          </p:nvPr>
-        </p:nvSpPr>
-        <p:spPr>
-          <a:xfrm>
-            <a:off x="68250" y="0"/>
-            <a:ext cx="777300" cy="576000"/>
-          </a:xfrm>
-          <a:prstGeom prst="rect">
-            <a:avLst/>
-          </a:prstGeom>
-        </p:spPr>
-        <p:txBody>
-          <a:bodyPr spcFirstLastPara="1" wrap="square" lIns="91425" tIns="91425" rIns="91425" bIns="91425" anchor="ctr" anchorCtr="0">
-            <a:noAutofit/>
-          </a:bodyPr>
-          <a:lstStyle/>
-          <a:p>
-            <a:pPr marL="0" lvl="0" indent="0" algn="l" rtl="0">
-              <a:spcBef>
-                <a:spcPts val="0"/>
-              </a:spcBef>
-              <a:spcAft>
-                <a:spcPts val="0"/>
-              </a:spcAft>
-              <a:buNone/>
-            </a:pPr>
-            <a:r>
-              <a:rPr lang="en" dirty="0"/>
-              <a:t>ILO </a:t>
-            </a:r>
-            <a:r>
-              <a:rPr lang="en-NL" dirty="0"/>
-              <a:t>6</a:t>
-            </a:r>
-            <a:endParaRPr dirty="0"/>
-          </a:p>
-        </p:txBody>
-      </p:sp>
-      <p:sp>
-        <p:nvSpPr>
-          <p:cNvPr id="476" name="Google Shape;476;p50"/>
-          <p:cNvSpPr txBox="1">
-            <a:spLocks noGrp="1"/>
-          </p:cNvSpPr>
-          <p:nvPr>
-            <p:ph type="title" idx="2"/>
-          </p:nvPr>
-        </p:nvSpPr>
-        <p:spPr>
-          <a:xfrm>
-            <a:off x="7068300" y="0"/>
-            <a:ext cx="1984200" cy="576000"/>
-          </a:xfrm>
-          <a:prstGeom prst="rect">
-            <a:avLst/>
-          </a:prstGeom>
-        </p:spPr>
-        <p:txBody>
-          <a:bodyPr spcFirstLastPara="1" wrap="square" lIns="91425" tIns="91425" rIns="91425" bIns="91425" anchor="b" anchorCtr="0">
-            <a:noAutofit/>
-          </a:bodyPr>
-          <a:lstStyle/>
-          <a:p>
-            <a:pPr marL="0" lvl="0" indent="0" algn="r" rtl="0">
-              <a:spcBef>
-                <a:spcPts val="0"/>
-              </a:spcBef>
-              <a:spcAft>
-                <a:spcPts val="0"/>
-              </a:spcAft>
-              <a:buNone/>
-            </a:pPr>
-            <a:r>
-              <a:rPr lang="en" dirty="0"/>
-              <a:t>7/7</a:t>
-            </a:r>
-            <a:endParaRPr dirty="0"/>
-          </a:p>
-        </p:txBody>
-      </p:sp>
-      <p:sp>
-        <p:nvSpPr>
-          <p:cNvPr id="477" name="Google Shape;477;p50"/>
-          <p:cNvSpPr txBox="1">
-            <a:spLocks noGrp="1"/>
-          </p:cNvSpPr>
-          <p:nvPr>
-            <p:ph type="body" idx="1"/>
-          </p:nvPr>
-        </p:nvSpPr>
-        <p:spPr>
-          <a:xfrm>
-            <a:off x="182880" y="1069848"/>
-            <a:ext cx="5486400" cy="3895200"/>
-          </a:xfrm>
-          <a:prstGeom prst="rect">
-            <a:avLst/>
-          </a:prstGeom>
-        </p:spPr>
-        <p:txBody>
-          <a:bodyPr spcFirstLastPara="1" wrap="square" lIns="91425" tIns="91425" rIns="91425" bIns="91425" anchor="t" anchorCtr="0">
-            <a:noAutofit/>
-          </a:bodyPr>
-          <a:lstStyle/>
-          <a:p>
-            <a:pPr marL="0" lvl="0" indent="0" algn="l" rtl="0">
-              <a:lnSpc>
-                <a:spcPct val="115000"/>
-              </a:lnSpc>
-              <a:spcBef>
-                <a:spcPts val="0"/>
-              </a:spcBef>
-              <a:spcAft>
-                <a:spcPts val="0"/>
-              </a:spcAft>
-              <a:buNone/>
-            </a:pPr>
-            <a:r>
-              <a:rPr lang="en-US" sz="900" i="1" dirty="0">
-                <a:solidFill>
-                  <a:schemeClr val="lt1"/>
-                </a:solidFill>
-                <a:latin typeface="Helvetica Neue"/>
-                <a:ea typeface="Helvetica Neue"/>
-                <a:cs typeface="Helvetica Neue"/>
-                <a:sym typeface="Helvetica Neue"/>
-              </a:rPr>
-              <a:t>Show </a:t>
-            </a:r>
-            <a:r>
-              <a:rPr lang="en-US" sz="900" b="1" i="1" dirty="0">
-                <a:solidFill>
-                  <a:schemeClr val="lt1"/>
-                </a:solidFill>
-                <a:latin typeface="Helvetica Neue"/>
-                <a:ea typeface="Helvetica Neue"/>
-                <a:cs typeface="Helvetica Neue"/>
-                <a:sym typeface="Helvetica Neue"/>
-              </a:rPr>
-              <a:t>using links to GitHub </a:t>
-            </a:r>
-            <a:r>
-              <a:rPr lang="en-US" sz="900" i="1" dirty="0">
-                <a:solidFill>
-                  <a:schemeClr val="lt1"/>
-                </a:solidFill>
-                <a:latin typeface="Helvetica Neue"/>
-                <a:ea typeface="Helvetica Neue"/>
-                <a:cs typeface="Helvetica Neue"/>
-                <a:sym typeface="Helvetica Neue"/>
-              </a:rPr>
-              <a:t>your best examples, do not go overboard, add in short description, you are free to alter this layout (or add slides per evidence) to suit your needs. Just be sure that it is clear.</a:t>
-            </a:r>
-            <a:endParaRPr lang="en-US" sz="900" dirty="0">
-              <a:solidFill>
-                <a:schemeClr val="lt1"/>
-              </a:solidFill>
-            </a:endParaRPr>
-          </a:p>
-          <a:p>
-            <a:pPr marL="0" lvl="0" indent="0" algn="l" rtl="0">
-              <a:lnSpc>
-                <a:spcPct val="115000"/>
-              </a:lnSpc>
-              <a:spcBef>
-                <a:spcPts val="0"/>
-              </a:spcBef>
-              <a:spcAft>
-                <a:spcPts val="0"/>
-              </a:spcAft>
-              <a:buNone/>
-            </a:pPr>
-            <a:endParaRPr lang="en-US" sz="700" i="1" dirty="0">
-              <a:solidFill>
-                <a:schemeClr val="lt1"/>
-              </a:solidFill>
-              <a:latin typeface="Helvetica Neue"/>
-              <a:ea typeface="Helvetica Neue"/>
-              <a:cs typeface="Helvetica Neue"/>
-              <a:sym typeface="Helvetica Neue"/>
-            </a:endParaRPr>
-          </a:p>
-        </p:txBody>
-      </p:sp>
-      <p:sp>
-        <p:nvSpPr>
-          <p:cNvPr id="479" name="Google Shape;479;p50"/>
-          <p:cNvSpPr txBox="1">
-            <a:spLocks noGrp="1"/>
-          </p:cNvSpPr>
-          <p:nvPr>
-            <p:ph type="title" idx="4"/>
-          </p:nvPr>
-        </p:nvSpPr>
-        <p:spPr>
-          <a:xfrm>
-            <a:off x="68250" y="576000"/>
-            <a:ext cx="839700" cy="493800"/>
-          </a:xfrm>
-          <a:prstGeom prst="rect">
-            <a:avLst/>
-          </a:prstGeom>
-        </p:spPr>
-        <p:txBody>
-          <a:bodyPr spcFirstLastPara="1" wrap="square" lIns="91425" tIns="91425" rIns="91425" bIns="91425" anchor="ctr" anchorCtr="0">
-            <a:noAutofit/>
-          </a:bodyPr>
-          <a:lstStyle/>
-          <a:p>
-            <a:pPr marL="0" lvl="0" indent="0" algn="l" rtl="0">
-              <a:spcBef>
-                <a:spcPts val="0"/>
-              </a:spcBef>
-              <a:spcAft>
-                <a:spcPts val="0"/>
-              </a:spcAft>
-              <a:buNone/>
-            </a:pPr>
-            <a:r>
-              <a:rPr lang="en-NL" dirty="0"/>
-              <a:t>6</a:t>
-            </a:r>
-            <a:r>
-              <a:rPr lang="en" dirty="0">
-                <a:solidFill>
-                  <a:srgbClr val="FFFFFF"/>
-                </a:solidFill>
-              </a:rPr>
-              <a:t>.</a:t>
-            </a:r>
-            <a:r>
-              <a:rPr lang="en-NL" dirty="0">
-                <a:solidFill>
-                  <a:srgbClr val="FFFFFF"/>
-                </a:solidFill>
-              </a:rPr>
-              <a:t>0</a:t>
-            </a:r>
-            <a:endParaRPr dirty="0">
-              <a:solidFill>
-                <a:srgbClr val="FFFFFF"/>
-              </a:solidFill>
-            </a:endParaRPr>
-          </a:p>
-        </p:txBody>
-      </p:sp>
-      <p:sp>
-        <p:nvSpPr>
-          <p:cNvPr id="480" name="Google Shape;480;p50"/>
-          <p:cNvSpPr txBox="1">
-            <a:spLocks noGrp="1"/>
-          </p:cNvSpPr>
-          <p:nvPr>
-            <p:ph type="title" idx="5"/>
-          </p:nvPr>
-        </p:nvSpPr>
-        <p:spPr>
-          <a:xfrm>
-            <a:off x="845550" y="576000"/>
-            <a:ext cx="7315200" cy="493800"/>
-          </a:xfrm>
-          <a:prstGeom prst="rect">
-            <a:avLst/>
-          </a:prstGeom>
-        </p:spPr>
-        <p:txBody>
-          <a:bodyPr spcFirstLastPara="1" wrap="square" lIns="91425" tIns="91425" rIns="91425" bIns="91425" anchor="ctr" anchorCtr="0">
-            <a:noAutofit/>
-          </a:bodyPr>
-          <a:lstStyle/>
-          <a:p>
-            <a:pPr marL="0" lvl="0" indent="0" algn="l" rtl="0">
-              <a:spcBef>
-                <a:spcPts val="0"/>
-              </a:spcBef>
-              <a:spcAft>
-                <a:spcPts val="0"/>
-              </a:spcAft>
-              <a:buNone/>
-            </a:pPr>
-            <a:r>
-              <a:rPr lang="en-US" dirty="0"/>
-              <a:t>The student is able to communicate technical concepts by means of a structured, coherent, and well-formatted professional report.	</a:t>
-            </a:r>
-          </a:p>
-        </p:txBody>
-      </p:sp>
-      <p:sp>
-        <p:nvSpPr>
-          <p:cNvPr id="7" name="Google Shape;459;p48">
-            <a:extLst>
-              <a:ext uri="{FF2B5EF4-FFF2-40B4-BE49-F238E27FC236}">
-                <a16:creationId xmlns:a16="http://schemas.microsoft.com/office/drawing/2014/main" id="{5161B9CD-FD90-1846-8EE0-48554F0A839A}"/>
-              </a:ext>
-            </a:extLst>
-          </p:cNvPr>
-          <p:cNvSpPr txBox="1">
-            <a:spLocks noGrp="1"/>
-          </p:cNvSpPr>
-          <p:nvPr>
-            <p:ph type="title" idx="3"/>
-          </p:nvPr>
-        </p:nvSpPr>
-        <p:spPr>
-          <a:xfrm>
-            <a:off x="2049462" y="0"/>
-            <a:ext cx="4206300" cy="576000"/>
-          </a:xfrm>
-          <a:prstGeom prst="rect">
-            <a:avLst/>
-          </a:prstGeom>
-        </p:spPr>
-        <p:txBody>
-          <a:bodyPr spcFirstLastPara="1" wrap="square" lIns="91425" tIns="91425" rIns="91425" bIns="91425" anchor="ctr" anchorCtr="0">
-            <a:noAutofit/>
-          </a:bodyPr>
-          <a:lstStyle/>
-          <a:p>
-            <a:pPr marL="0" lvl="0" indent="0" algn="l" rtl="0">
-              <a:spcBef>
-                <a:spcPts val="0"/>
-              </a:spcBef>
-              <a:spcAft>
-                <a:spcPts val="0"/>
-              </a:spcAft>
-              <a:buNone/>
-            </a:pPr>
-            <a:r>
-              <a:rPr lang="en-US" dirty="0"/>
-              <a:t>The student is able to communicate technical concepts by means of a structured, coherent, and well-formatted professional report.</a:t>
-            </a:r>
-            <a:endParaRPr lang="en-GB" dirty="0"/>
-          </a:p>
-        </p:txBody>
-      </p:sp>
-      <p:sp>
-        <p:nvSpPr>
-          <p:cNvPr id="2" name="Google Shape;462;p48">
-            <a:extLst>
-              <a:ext uri="{FF2B5EF4-FFF2-40B4-BE49-F238E27FC236}">
-                <a16:creationId xmlns:a16="http://schemas.microsoft.com/office/drawing/2014/main" id="{504CBF35-FBEA-FA87-F016-E6278C3C94BB}"/>
-              </a:ext>
-            </a:extLst>
-          </p:cNvPr>
-          <p:cNvSpPr txBox="1">
-            <a:spLocks noGrp="1"/>
-          </p:cNvSpPr>
-          <p:nvPr>
-            <p:ph type="title" idx="6"/>
-          </p:nvPr>
-        </p:nvSpPr>
-        <p:spPr>
-          <a:xfrm>
-            <a:off x="845550" y="0"/>
-            <a:ext cx="1368600" cy="576000"/>
-          </a:xfrm>
-          <a:prstGeom prst="rect">
-            <a:avLst/>
-          </a:prstGeom>
-        </p:spPr>
-        <p:txBody>
-          <a:bodyPr spcFirstLastPara="1" wrap="square" lIns="91425" tIns="91425" rIns="91425" bIns="91425" anchor="ctr" anchorCtr="0">
-            <a:noAutofit/>
-          </a:bodyPr>
-          <a:lstStyle/>
-          <a:p>
-            <a:pPr marL="0" lvl="0" indent="0" algn="l" rtl="0">
-              <a:spcBef>
-                <a:spcPts val="0"/>
-              </a:spcBef>
-              <a:spcAft>
-                <a:spcPts val="0"/>
-              </a:spcAft>
-              <a:buNone/>
-            </a:pPr>
-            <a:r>
-              <a:rPr lang="en-US" dirty="0"/>
-              <a:t>Reporting</a:t>
-            </a:r>
-          </a:p>
-        </p:txBody>
-      </p:sp>
-    </p:spTree>
-    <p:extLst>
-      <p:ext uri="{BB962C8B-B14F-4D97-AF65-F5344CB8AC3E}">
-        <p14:creationId xmlns:p14="http://schemas.microsoft.com/office/powerpoint/2010/main" val="229156798"/>
-      </p:ext>
-    </p:extLst>
-  </p:cSld>
-  <p:clrMapOvr>
-    <a:masterClrMapping/>
-  </p:clrMapOvr>
-</p:sld>
-</file>
-
-<file path=ppt/slides/slide36.xml><?xml version="1.0" encoding="utf-8"?>
+<file path=ppt/slides/slide33.xml><?xml version="1.0" encoding="utf-8"?>
 <p:sld xmlns:a="http://schemas.openxmlformats.org/drawingml/2006/main" xmlns:r="http://schemas.openxmlformats.org/officeDocument/2006/relationships" xmlns:p="http://schemas.openxmlformats.org/presentationml/2006/main">
   <p:cSld>
     <p:spTree>
@@ -23962,7 +22538,7 @@
 </p:sld>
 </file>
 
-<file path=ppt/slides/slide37.xml><?xml version="1.0" encoding="utf-8"?>
+<file path=ppt/slides/slide34.xml><?xml version="1.0" encoding="utf-8"?>
 <p:sld xmlns:a="http://schemas.openxmlformats.org/drawingml/2006/main" xmlns:r="http://schemas.openxmlformats.org/officeDocument/2006/relationships" xmlns:p="http://schemas.openxmlformats.org/presentationml/2006/main">
   <p:cSld>
     <p:spTree>
@@ -24296,7 +22872,7 @@
 </p:sld>
 </file>
 
-<file path=ppt/slides/slide38.xml><?xml version="1.0" encoding="utf-8"?>
+<file path=ppt/slides/slide35.xml><?xml version="1.0" encoding="utf-8"?>
 <p:sld xmlns:a="http://schemas.openxmlformats.org/drawingml/2006/main" xmlns:r="http://schemas.openxmlformats.org/officeDocument/2006/relationships" xmlns:p="http://schemas.openxmlformats.org/presentationml/2006/main">
   <p:cSld>
     <p:spTree>
@@ -24467,7 +23043,7 @@
 </p:sld>
 </file>
 
-<file path=ppt/slides/slide39.xml><?xml version="1.0" encoding="utf-8"?>
+<file path=ppt/slides/slide36.xml><?xml version="1.0" encoding="utf-8"?>
 <p:sld xmlns:a="http://schemas.openxmlformats.org/drawingml/2006/main" xmlns:r="http://schemas.openxmlformats.org/officeDocument/2006/relationships" xmlns:p="http://schemas.openxmlformats.org/presentationml/2006/main">
   <p:cSld>
     <p:spTree>
@@ -24779,6 +23355,351 @@
               <a:t>C</a:t>
             </a:r>
             <a:endParaRPr/>
+          </a:p>
+        </p:txBody>
+      </p:sp>
+    </p:spTree>
+  </p:cSld>
+  <p:clrMapOvr>
+    <a:masterClrMapping/>
+  </p:clrMapOvr>
+</p:sld>
+</file>
+
+<file path=ppt/slides/slide37.xml><?xml version="1.0" encoding="utf-8"?>
+<p:sld xmlns:a="http://schemas.openxmlformats.org/drawingml/2006/main" xmlns:r="http://schemas.openxmlformats.org/officeDocument/2006/relationships" xmlns:p="http://schemas.openxmlformats.org/presentationml/2006/main">
+  <p:cSld>
+    <p:spTree>
+      <p:nvGrpSpPr>
+        <p:cNvPr id="1" name="Shape 512"/>
+        <p:cNvGrpSpPr/>
+        <p:nvPr/>
+      </p:nvGrpSpPr>
+      <p:grpSpPr>
+        <a:xfrm>
+          <a:off x="0" y="0"/>
+          <a:ext cx="0" cy="0"/>
+          <a:chOff x="0" y="0"/>
+          <a:chExt cx="0" cy="0"/>
+        </a:xfrm>
+      </p:grpSpPr>
+      <p:sp>
+        <p:nvSpPr>
+          <p:cNvPr id="513" name="Google Shape;513;p54"/>
+          <p:cNvSpPr txBox="1">
+            <a:spLocks noGrp="1"/>
+          </p:cNvSpPr>
+          <p:nvPr>
+            <p:ph type="title"/>
+          </p:nvPr>
+        </p:nvSpPr>
+        <p:spPr>
+          <a:xfrm>
+            <a:off x="667512" y="0"/>
+            <a:ext cx="5486400" cy="572700"/>
+          </a:xfrm>
+          <a:prstGeom prst="rect">
+            <a:avLst/>
+          </a:prstGeom>
+        </p:spPr>
+        <p:txBody>
+          <a:bodyPr spcFirstLastPara="1" wrap="square" lIns="91425" tIns="91425" rIns="91425" bIns="91425" anchor="ctr" anchorCtr="0">
+            <a:noAutofit/>
+          </a:bodyPr>
+          <a:lstStyle/>
+          <a:p>
+            <a:pPr marL="0" lvl="0" indent="0" algn="l" rtl="0">
+              <a:spcBef>
+                <a:spcPts val="0"/>
+              </a:spcBef>
+              <a:spcAft>
+                <a:spcPts val="0"/>
+              </a:spcAft>
+              <a:buNone/>
+            </a:pPr>
+            <a:r>
+              <a:rPr lang="en"/>
+              <a:t>How well am I progressing?</a:t>
+            </a:r>
+            <a:endParaRPr/>
+          </a:p>
+        </p:txBody>
+      </p:sp>
+      <p:sp>
+        <p:nvSpPr>
+          <p:cNvPr id="514" name="Google Shape;514;p54"/>
+          <p:cNvSpPr txBox="1">
+            <a:spLocks noGrp="1"/>
+          </p:cNvSpPr>
+          <p:nvPr>
+            <p:ph type="title" idx="2"/>
+          </p:nvPr>
+        </p:nvSpPr>
+        <p:spPr>
+          <a:xfrm>
+            <a:off x="7068300" y="0"/>
+            <a:ext cx="1984200" cy="572700"/>
+          </a:xfrm>
+          <a:prstGeom prst="rect">
+            <a:avLst/>
+          </a:prstGeom>
+        </p:spPr>
+        <p:txBody>
+          <a:bodyPr spcFirstLastPara="1" wrap="square" lIns="91425" tIns="91425" rIns="91425" bIns="91425" anchor="b" anchorCtr="0">
+            <a:noAutofit/>
+          </a:bodyPr>
+          <a:lstStyle/>
+          <a:p>
+            <a:pPr marL="0" lvl="0" indent="0" algn="r" rtl="0">
+              <a:spcBef>
+                <a:spcPts val="0"/>
+              </a:spcBef>
+              <a:spcAft>
+                <a:spcPts val="0"/>
+              </a:spcAft>
+              <a:buNone/>
+            </a:pPr>
+            <a:r>
+              <a:rPr lang="en"/>
+              <a:t>2</a:t>
+            </a:r>
+            <a:r>
+              <a:rPr lang="en" sz="1400"/>
+              <a:t>/</a:t>
+            </a:r>
+            <a:r>
+              <a:rPr lang="en"/>
+              <a:t>2</a:t>
+            </a:r>
+            <a:endParaRPr sz="1400"/>
+          </a:p>
+        </p:txBody>
+      </p:sp>
+      <p:sp>
+        <p:nvSpPr>
+          <p:cNvPr id="515" name="Google Shape;515;p54"/>
+          <p:cNvSpPr txBox="1">
+            <a:spLocks noGrp="1"/>
+          </p:cNvSpPr>
+          <p:nvPr>
+            <p:ph type="title" idx="4"/>
+          </p:nvPr>
+        </p:nvSpPr>
+        <p:spPr>
+          <a:xfrm>
+            <a:off x="0" y="0"/>
+            <a:ext cx="576000" cy="572700"/>
+          </a:xfrm>
+          <a:prstGeom prst="rect">
+            <a:avLst/>
+          </a:prstGeom>
+        </p:spPr>
+        <p:txBody>
+          <a:bodyPr spcFirstLastPara="1" wrap="square" lIns="91425" tIns="91425" rIns="91425" bIns="91425" anchor="ctr" anchorCtr="0">
+            <a:noAutofit/>
+          </a:bodyPr>
+          <a:lstStyle/>
+          <a:p>
+            <a:pPr marL="0" lvl="0" indent="0" algn="ctr" rtl="0">
+              <a:spcBef>
+                <a:spcPts val="0"/>
+              </a:spcBef>
+              <a:spcAft>
+                <a:spcPts val="0"/>
+              </a:spcAft>
+              <a:buNone/>
+            </a:pPr>
+            <a:r>
+              <a:rPr lang="en"/>
+              <a:t>C</a:t>
+            </a:r>
+            <a:endParaRPr/>
+          </a:p>
+        </p:txBody>
+      </p:sp>
+      <p:sp>
+        <p:nvSpPr>
+          <p:cNvPr id="516" name="Google Shape;516;p54"/>
+          <p:cNvSpPr txBox="1">
+            <a:spLocks noGrp="1"/>
+          </p:cNvSpPr>
+          <p:nvPr>
+            <p:ph type="subTitle" idx="1"/>
+          </p:nvPr>
+        </p:nvSpPr>
+        <p:spPr>
+          <a:xfrm>
+            <a:off x="182880" y="667512"/>
+            <a:ext cx="8778300" cy="402300"/>
+          </a:xfrm>
+          <a:prstGeom prst="rect">
+            <a:avLst/>
+          </a:prstGeom>
+        </p:spPr>
+        <p:txBody>
+          <a:bodyPr spcFirstLastPara="1" wrap="square" lIns="91425" tIns="91425" rIns="91425" bIns="91425" anchor="t" anchorCtr="0">
+            <a:noAutofit/>
+          </a:bodyPr>
+          <a:lstStyle/>
+          <a:p>
+            <a:pPr marL="0" lvl="0" indent="0" algn="l" rtl="0">
+              <a:spcBef>
+                <a:spcPts val="0"/>
+              </a:spcBef>
+              <a:spcAft>
+                <a:spcPts val="800"/>
+              </a:spcAft>
+              <a:buNone/>
+            </a:pPr>
+            <a:r>
+              <a:rPr lang="en"/>
+              <a:t>Reflection on my self assessment						My self assessment grade is a</a:t>
+            </a:r>
+            <a:endParaRPr b="0" i="1"/>
+          </a:p>
+        </p:txBody>
+      </p:sp>
+      <p:sp>
+        <p:nvSpPr>
+          <p:cNvPr id="517" name="Google Shape;517;p54"/>
+          <p:cNvSpPr txBox="1">
+            <a:spLocks noGrp="1"/>
+          </p:cNvSpPr>
+          <p:nvPr>
+            <p:ph type="body" idx="3"/>
+          </p:nvPr>
+        </p:nvSpPr>
+        <p:spPr>
+          <a:xfrm>
+            <a:off x="182880" y="1069848"/>
+            <a:ext cx="5852100" cy="3895200"/>
+          </a:xfrm>
+          <a:prstGeom prst="rect">
+            <a:avLst/>
+          </a:prstGeom>
+        </p:spPr>
+        <p:txBody>
+          <a:bodyPr spcFirstLastPara="1" wrap="square" lIns="91425" tIns="91425" rIns="91425" bIns="91425" anchor="t" anchorCtr="0">
+            <a:noAutofit/>
+          </a:bodyPr>
+          <a:lstStyle/>
+          <a:p>
+            <a:pPr marL="0" lvl="0" indent="0" algn="just" rtl="0">
+              <a:spcBef>
+                <a:spcPts val="0"/>
+              </a:spcBef>
+              <a:spcAft>
+                <a:spcPts val="0"/>
+              </a:spcAft>
+              <a:buNone/>
+            </a:pPr>
+            <a:r>
+              <a:rPr lang="en"/>
+              <a:t>...</a:t>
+            </a:r>
+            <a:endParaRPr/>
+          </a:p>
+          <a:p>
+            <a:pPr marL="0" lvl="0" indent="0" algn="just" rtl="0">
+              <a:spcBef>
+                <a:spcPts val="800"/>
+              </a:spcBef>
+              <a:spcAft>
+                <a:spcPts val="0"/>
+              </a:spcAft>
+              <a:buNone/>
+            </a:pPr>
+            <a:endParaRPr/>
+          </a:p>
+          <a:p>
+            <a:pPr marL="0" lvl="0" indent="0" algn="just" rtl="0">
+              <a:spcBef>
+                <a:spcPts val="800"/>
+              </a:spcBef>
+              <a:spcAft>
+                <a:spcPts val="0"/>
+              </a:spcAft>
+              <a:buNone/>
+            </a:pPr>
+            <a:r>
+              <a:rPr lang="en" sz="1400" b="1"/>
+              <a:t>How I plan to improve next block</a:t>
+            </a:r>
+            <a:endParaRPr sz="1400" b="1"/>
+          </a:p>
+          <a:p>
+            <a:pPr marL="0" lvl="0" indent="0" algn="just" rtl="0">
+              <a:spcBef>
+                <a:spcPts val="800"/>
+              </a:spcBef>
+              <a:spcAft>
+                <a:spcPts val="800"/>
+              </a:spcAft>
+              <a:buNone/>
+            </a:pPr>
+            <a:r>
+              <a:rPr lang="en"/>
+              <a:t>...</a:t>
+            </a:r>
+            <a:endParaRPr/>
+          </a:p>
+        </p:txBody>
+      </p:sp>
+      <p:sp>
+        <p:nvSpPr>
+          <p:cNvPr id="518" name="Google Shape;518;p54"/>
+          <p:cNvSpPr txBox="1"/>
+          <p:nvPr/>
+        </p:nvSpPr>
+        <p:spPr>
+          <a:xfrm>
+            <a:off x="7918704" y="676700"/>
+            <a:ext cx="914400" cy="640200"/>
+          </a:xfrm>
+          <a:prstGeom prst="rect">
+            <a:avLst/>
+          </a:prstGeom>
+          <a:noFill/>
+          <a:ln>
+            <a:noFill/>
+          </a:ln>
+        </p:spPr>
+        <p:txBody>
+          <a:bodyPr spcFirstLastPara="1" wrap="square" lIns="91425" tIns="91425" rIns="91425" bIns="91425" anchor="t" anchorCtr="0">
+            <a:noAutofit/>
+          </a:bodyPr>
+          <a:lstStyle/>
+          <a:p>
+            <a:pPr marL="0" lvl="0" indent="0" algn="l" rtl="0">
+              <a:spcBef>
+                <a:spcPts val="0"/>
+              </a:spcBef>
+              <a:spcAft>
+                <a:spcPts val="0"/>
+              </a:spcAft>
+              <a:buNone/>
+            </a:pPr>
+            <a:r>
+              <a:rPr lang="en" sz="3600" b="1">
+                <a:solidFill>
+                  <a:srgbClr val="434343"/>
+                </a:solidFill>
+                <a:latin typeface="Roboto"/>
+                <a:ea typeface="Roboto"/>
+                <a:cs typeface="Roboto"/>
+                <a:sym typeface="Roboto"/>
+              </a:rPr>
+              <a:t>x.x</a:t>
+            </a:r>
+            <a:endParaRPr sz="3600" b="1">
+              <a:solidFill>
+                <a:srgbClr val="434343"/>
+              </a:solidFill>
+              <a:latin typeface="Roboto"/>
+              <a:ea typeface="Roboto"/>
+              <a:cs typeface="Roboto"/>
+              <a:sym typeface="Roboto"/>
+            </a:endParaRPr>
           </a:p>
         </p:txBody>
       </p:sp>
@@ -25001,351 +23922,6 @@
               <a:t>Not relevant this block! Becomes relevant in Block D!</a:t>
             </a:r>
             <a:endParaRPr lang="en-US" sz="1100" dirty="0"/>
-          </a:p>
-        </p:txBody>
-      </p:sp>
-    </p:spTree>
-  </p:cSld>
-  <p:clrMapOvr>
-    <a:masterClrMapping/>
-  </p:clrMapOvr>
-</p:sld>
-</file>
-
-<file path=ppt/slides/slide40.xml><?xml version="1.0" encoding="utf-8"?>
-<p:sld xmlns:a="http://schemas.openxmlformats.org/drawingml/2006/main" xmlns:r="http://schemas.openxmlformats.org/officeDocument/2006/relationships" xmlns:p="http://schemas.openxmlformats.org/presentationml/2006/main">
-  <p:cSld>
-    <p:spTree>
-      <p:nvGrpSpPr>
-        <p:cNvPr id="1" name="Shape 512"/>
-        <p:cNvGrpSpPr/>
-        <p:nvPr/>
-      </p:nvGrpSpPr>
-      <p:grpSpPr>
-        <a:xfrm>
-          <a:off x="0" y="0"/>
-          <a:ext cx="0" cy="0"/>
-          <a:chOff x="0" y="0"/>
-          <a:chExt cx="0" cy="0"/>
-        </a:xfrm>
-      </p:grpSpPr>
-      <p:sp>
-        <p:nvSpPr>
-          <p:cNvPr id="513" name="Google Shape;513;p54"/>
-          <p:cNvSpPr txBox="1">
-            <a:spLocks noGrp="1"/>
-          </p:cNvSpPr>
-          <p:nvPr>
-            <p:ph type="title"/>
-          </p:nvPr>
-        </p:nvSpPr>
-        <p:spPr>
-          <a:xfrm>
-            <a:off x="667512" y="0"/>
-            <a:ext cx="5486400" cy="572700"/>
-          </a:xfrm>
-          <a:prstGeom prst="rect">
-            <a:avLst/>
-          </a:prstGeom>
-        </p:spPr>
-        <p:txBody>
-          <a:bodyPr spcFirstLastPara="1" wrap="square" lIns="91425" tIns="91425" rIns="91425" bIns="91425" anchor="ctr" anchorCtr="0">
-            <a:noAutofit/>
-          </a:bodyPr>
-          <a:lstStyle/>
-          <a:p>
-            <a:pPr marL="0" lvl="0" indent="0" algn="l" rtl="0">
-              <a:spcBef>
-                <a:spcPts val="0"/>
-              </a:spcBef>
-              <a:spcAft>
-                <a:spcPts val="0"/>
-              </a:spcAft>
-              <a:buNone/>
-            </a:pPr>
-            <a:r>
-              <a:rPr lang="en"/>
-              <a:t>How well am I progressing?</a:t>
-            </a:r>
-            <a:endParaRPr/>
-          </a:p>
-        </p:txBody>
-      </p:sp>
-      <p:sp>
-        <p:nvSpPr>
-          <p:cNvPr id="514" name="Google Shape;514;p54"/>
-          <p:cNvSpPr txBox="1">
-            <a:spLocks noGrp="1"/>
-          </p:cNvSpPr>
-          <p:nvPr>
-            <p:ph type="title" idx="2"/>
-          </p:nvPr>
-        </p:nvSpPr>
-        <p:spPr>
-          <a:xfrm>
-            <a:off x="7068300" y="0"/>
-            <a:ext cx="1984200" cy="572700"/>
-          </a:xfrm>
-          <a:prstGeom prst="rect">
-            <a:avLst/>
-          </a:prstGeom>
-        </p:spPr>
-        <p:txBody>
-          <a:bodyPr spcFirstLastPara="1" wrap="square" lIns="91425" tIns="91425" rIns="91425" bIns="91425" anchor="b" anchorCtr="0">
-            <a:noAutofit/>
-          </a:bodyPr>
-          <a:lstStyle/>
-          <a:p>
-            <a:pPr marL="0" lvl="0" indent="0" algn="r" rtl="0">
-              <a:spcBef>
-                <a:spcPts val="0"/>
-              </a:spcBef>
-              <a:spcAft>
-                <a:spcPts val="0"/>
-              </a:spcAft>
-              <a:buNone/>
-            </a:pPr>
-            <a:r>
-              <a:rPr lang="en"/>
-              <a:t>2</a:t>
-            </a:r>
-            <a:r>
-              <a:rPr lang="en" sz="1400"/>
-              <a:t>/</a:t>
-            </a:r>
-            <a:r>
-              <a:rPr lang="en"/>
-              <a:t>2</a:t>
-            </a:r>
-            <a:endParaRPr sz="1400"/>
-          </a:p>
-        </p:txBody>
-      </p:sp>
-      <p:sp>
-        <p:nvSpPr>
-          <p:cNvPr id="515" name="Google Shape;515;p54"/>
-          <p:cNvSpPr txBox="1">
-            <a:spLocks noGrp="1"/>
-          </p:cNvSpPr>
-          <p:nvPr>
-            <p:ph type="title" idx="4"/>
-          </p:nvPr>
-        </p:nvSpPr>
-        <p:spPr>
-          <a:xfrm>
-            <a:off x="0" y="0"/>
-            <a:ext cx="576000" cy="572700"/>
-          </a:xfrm>
-          <a:prstGeom prst="rect">
-            <a:avLst/>
-          </a:prstGeom>
-        </p:spPr>
-        <p:txBody>
-          <a:bodyPr spcFirstLastPara="1" wrap="square" lIns="91425" tIns="91425" rIns="91425" bIns="91425" anchor="ctr" anchorCtr="0">
-            <a:noAutofit/>
-          </a:bodyPr>
-          <a:lstStyle/>
-          <a:p>
-            <a:pPr marL="0" lvl="0" indent="0" algn="ctr" rtl="0">
-              <a:spcBef>
-                <a:spcPts val="0"/>
-              </a:spcBef>
-              <a:spcAft>
-                <a:spcPts val="0"/>
-              </a:spcAft>
-              <a:buNone/>
-            </a:pPr>
-            <a:r>
-              <a:rPr lang="en"/>
-              <a:t>C</a:t>
-            </a:r>
-            <a:endParaRPr/>
-          </a:p>
-        </p:txBody>
-      </p:sp>
-      <p:sp>
-        <p:nvSpPr>
-          <p:cNvPr id="516" name="Google Shape;516;p54"/>
-          <p:cNvSpPr txBox="1">
-            <a:spLocks noGrp="1"/>
-          </p:cNvSpPr>
-          <p:nvPr>
-            <p:ph type="subTitle" idx="1"/>
-          </p:nvPr>
-        </p:nvSpPr>
-        <p:spPr>
-          <a:xfrm>
-            <a:off x="182880" y="667512"/>
-            <a:ext cx="8778300" cy="402300"/>
-          </a:xfrm>
-          <a:prstGeom prst="rect">
-            <a:avLst/>
-          </a:prstGeom>
-        </p:spPr>
-        <p:txBody>
-          <a:bodyPr spcFirstLastPara="1" wrap="square" lIns="91425" tIns="91425" rIns="91425" bIns="91425" anchor="t" anchorCtr="0">
-            <a:noAutofit/>
-          </a:bodyPr>
-          <a:lstStyle/>
-          <a:p>
-            <a:pPr marL="0" lvl="0" indent="0" algn="l" rtl="0">
-              <a:spcBef>
-                <a:spcPts val="0"/>
-              </a:spcBef>
-              <a:spcAft>
-                <a:spcPts val="800"/>
-              </a:spcAft>
-              <a:buNone/>
-            </a:pPr>
-            <a:r>
-              <a:rPr lang="en"/>
-              <a:t>Reflection on my self assessment						My self assessment grade is a</a:t>
-            </a:r>
-            <a:endParaRPr b="0" i="1"/>
-          </a:p>
-        </p:txBody>
-      </p:sp>
-      <p:sp>
-        <p:nvSpPr>
-          <p:cNvPr id="517" name="Google Shape;517;p54"/>
-          <p:cNvSpPr txBox="1">
-            <a:spLocks noGrp="1"/>
-          </p:cNvSpPr>
-          <p:nvPr>
-            <p:ph type="body" idx="3"/>
-          </p:nvPr>
-        </p:nvSpPr>
-        <p:spPr>
-          <a:xfrm>
-            <a:off x="182880" y="1069848"/>
-            <a:ext cx="5852100" cy="3895200"/>
-          </a:xfrm>
-          <a:prstGeom prst="rect">
-            <a:avLst/>
-          </a:prstGeom>
-        </p:spPr>
-        <p:txBody>
-          <a:bodyPr spcFirstLastPara="1" wrap="square" lIns="91425" tIns="91425" rIns="91425" bIns="91425" anchor="t" anchorCtr="0">
-            <a:noAutofit/>
-          </a:bodyPr>
-          <a:lstStyle/>
-          <a:p>
-            <a:pPr marL="0" lvl="0" indent="0" algn="just" rtl="0">
-              <a:spcBef>
-                <a:spcPts val="0"/>
-              </a:spcBef>
-              <a:spcAft>
-                <a:spcPts val="0"/>
-              </a:spcAft>
-              <a:buNone/>
-            </a:pPr>
-            <a:r>
-              <a:rPr lang="en"/>
-              <a:t>...</a:t>
-            </a:r>
-            <a:endParaRPr/>
-          </a:p>
-          <a:p>
-            <a:pPr marL="0" lvl="0" indent="0" algn="just" rtl="0">
-              <a:spcBef>
-                <a:spcPts val="800"/>
-              </a:spcBef>
-              <a:spcAft>
-                <a:spcPts val="0"/>
-              </a:spcAft>
-              <a:buNone/>
-            </a:pPr>
-            <a:endParaRPr/>
-          </a:p>
-          <a:p>
-            <a:pPr marL="0" lvl="0" indent="0" algn="just" rtl="0">
-              <a:spcBef>
-                <a:spcPts val="800"/>
-              </a:spcBef>
-              <a:spcAft>
-                <a:spcPts val="0"/>
-              </a:spcAft>
-              <a:buNone/>
-            </a:pPr>
-            <a:r>
-              <a:rPr lang="en" sz="1400" b="1"/>
-              <a:t>How I plan to improve next block</a:t>
-            </a:r>
-            <a:endParaRPr sz="1400" b="1"/>
-          </a:p>
-          <a:p>
-            <a:pPr marL="0" lvl="0" indent="0" algn="just" rtl="0">
-              <a:spcBef>
-                <a:spcPts val="800"/>
-              </a:spcBef>
-              <a:spcAft>
-                <a:spcPts val="800"/>
-              </a:spcAft>
-              <a:buNone/>
-            </a:pPr>
-            <a:r>
-              <a:rPr lang="en"/>
-              <a:t>...</a:t>
-            </a:r>
-            <a:endParaRPr/>
-          </a:p>
-        </p:txBody>
-      </p:sp>
-      <p:sp>
-        <p:nvSpPr>
-          <p:cNvPr id="518" name="Google Shape;518;p54"/>
-          <p:cNvSpPr txBox="1"/>
-          <p:nvPr/>
-        </p:nvSpPr>
-        <p:spPr>
-          <a:xfrm>
-            <a:off x="7918704" y="676700"/>
-            <a:ext cx="914400" cy="640200"/>
-          </a:xfrm>
-          <a:prstGeom prst="rect">
-            <a:avLst/>
-          </a:prstGeom>
-          <a:noFill/>
-          <a:ln>
-            <a:noFill/>
-          </a:ln>
-        </p:spPr>
-        <p:txBody>
-          <a:bodyPr spcFirstLastPara="1" wrap="square" lIns="91425" tIns="91425" rIns="91425" bIns="91425" anchor="t" anchorCtr="0">
-            <a:noAutofit/>
-          </a:bodyPr>
-          <a:lstStyle/>
-          <a:p>
-            <a:pPr marL="0" lvl="0" indent="0" algn="l" rtl="0">
-              <a:spcBef>
-                <a:spcPts val="0"/>
-              </a:spcBef>
-              <a:spcAft>
-                <a:spcPts val="0"/>
-              </a:spcAft>
-              <a:buNone/>
-            </a:pPr>
-            <a:r>
-              <a:rPr lang="en" sz="3600" b="1">
-                <a:solidFill>
-                  <a:srgbClr val="434343"/>
-                </a:solidFill>
-                <a:latin typeface="Roboto"/>
-                <a:ea typeface="Roboto"/>
-                <a:cs typeface="Roboto"/>
-                <a:sym typeface="Roboto"/>
-              </a:rPr>
-              <a:t>x.x</a:t>
-            </a:r>
-            <a:endParaRPr sz="3600" b="1">
-              <a:solidFill>
-                <a:srgbClr val="434343"/>
-              </a:solidFill>
-              <a:latin typeface="Roboto"/>
-              <a:ea typeface="Roboto"/>
-              <a:cs typeface="Roboto"/>
-              <a:sym typeface="Roboto"/>
-            </a:endParaRPr>
           </a:p>
         </p:txBody>
       </p:sp>
@@ -27544,17 +26120,6 @@
 </file>
 
 <file path=customXml/item1.xml><?xml version="1.0" encoding="utf-8"?>
-<p:properties xmlns:p="http://schemas.microsoft.com/office/2006/metadata/properties" xmlns:xsi="http://www.w3.org/2001/XMLSchema-instance" xmlns:pc="http://schemas.microsoft.com/office/infopath/2007/PartnerControls">
-  <documentManagement>
-    <lcf76f155ced4ddcb4097134ff3c332f xmlns="bd38d267-56bb-4e22-b975-199a06fd69fa">
-      <Terms xmlns="http://schemas.microsoft.com/office/infopath/2007/PartnerControls"/>
-    </lcf76f155ced4ddcb4097134ff3c332f>
-    <TaxCatchAll xmlns="d8c712e5-67fc-4595-93cb-a4164dd8eff3" xsi:nil="true"/>
-  </documentManagement>
-</p:properties>
-</file>
-
-<file path=customXml/item2.xml><?xml version="1.0" encoding="utf-8"?>
 <?mso-contentType ?>
 <FormTemplates xmlns="http://schemas.microsoft.com/sharepoint/v3/contenttype/forms">
   <Display>DocumentLibraryForm</Display>
@@ -27563,7 +26128,7 @@
 </FormTemplates>
 </file>
 
-<file path=customXml/item3.xml><?xml version="1.0" encoding="utf-8"?>
+<file path=customXml/item2.xml><?xml version="1.0" encoding="utf-8"?>
 <ct:contentTypeSchema xmlns:ct="http://schemas.microsoft.com/office/2006/metadata/contentType" xmlns:ma="http://schemas.microsoft.com/office/2006/metadata/properties/metaAttributes" ct:_="" ma:_="" ma:contentTypeName="Document" ma:contentTypeID="0x01010064DEF28CA2629948A9F801C782641252" ma:contentTypeVersion="16" ma:contentTypeDescription="Create a new document." ma:contentTypeScope="" ma:versionID="9c6005e7f719c391f8a081f21693d65f">
   <xsd:schema xmlns:xsd="http://www.w3.org/2001/XMLSchema" xmlns:xs="http://www.w3.org/2001/XMLSchema" xmlns:p="http://schemas.microsoft.com/office/2006/metadata/properties" xmlns:ns2="bd38d267-56bb-4e22-b975-199a06fd69fa" xmlns:ns3="d8c712e5-67fc-4595-93cb-a4164dd8eff3" targetNamespace="http://schemas.microsoft.com/office/2006/metadata/properties" ma:root="true" ma:fieldsID="ac16135cc8f915f339c57eb2d0574bad" ns2:_="" ns3:_="">
     <xsd:import namespace="bd38d267-56bb-4e22-b975-199a06fd69fa"/>
@@ -27806,7 +26371,45 @@
 </ct:contentTypeSchema>
 </file>
 
+<file path=customXml/item3.xml><?xml version="1.0" encoding="utf-8"?>
+<p:properties xmlns:p="http://schemas.microsoft.com/office/2006/metadata/properties" xmlns:xsi="http://www.w3.org/2001/XMLSchema-instance" xmlns:pc="http://schemas.microsoft.com/office/infopath/2007/PartnerControls">
+  <documentManagement>
+    <lcf76f155ced4ddcb4097134ff3c332f xmlns="bd38d267-56bb-4e22-b975-199a06fd69fa">
+      <Terms xmlns="http://schemas.microsoft.com/office/infopath/2007/PartnerControls"/>
+    </lcf76f155ced4ddcb4097134ff3c332f>
+    <TaxCatchAll xmlns="d8c712e5-67fc-4595-93cb-a4164dd8eff3" xsi:nil="true"/>
+  </documentManagement>
+</p:properties>
+</file>
+
 <file path=customXml/itemProps1.xml><?xml version="1.0" encoding="utf-8"?>
+<ds:datastoreItem xmlns:ds="http://schemas.openxmlformats.org/officeDocument/2006/customXml" ds:itemID="{98D9791E-52D0-4ABB-925A-4EAECF798D9B}">
+  <ds:schemaRefs>
+    <ds:schemaRef ds:uri="http://schemas.microsoft.com/sharepoint/v3/contenttype/forms"/>
+  </ds:schemaRefs>
+</ds:datastoreItem>
+</file>
+
+<file path=customXml/itemProps2.xml><?xml version="1.0" encoding="utf-8"?>
+<ds:datastoreItem xmlns:ds="http://schemas.openxmlformats.org/officeDocument/2006/customXml" ds:itemID="{C14D352B-E5BB-4807-96CD-F68A176C35D6}">
+  <ds:schemaRefs>
+    <ds:schemaRef ds:uri="http://schemas.microsoft.com/office/2006/metadata/contentType"/>
+    <ds:schemaRef ds:uri="http://schemas.microsoft.com/office/2006/metadata/properties/metaAttributes"/>
+    <ds:schemaRef ds:uri="http://www.w3.org/2001/XMLSchema"/>
+    <ds:schemaRef ds:uri="http://schemas.microsoft.com/office/2006/metadata/properties"/>
+    <ds:schemaRef ds:uri="bd38d267-56bb-4e22-b975-199a06fd69fa"/>
+    <ds:schemaRef ds:uri="d8c712e5-67fc-4595-93cb-a4164dd8eff3"/>
+    <ds:schemaRef ds:uri="http://schemas.microsoft.com/office/2006/documentManagement/types"/>
+    <ds:schemaRef ds:uri="http://schemas.microsoft.com/office/infopath/2007/PartnerControls"/>
+    <ds:schemaRef ds:uri="http://schemas.openxmlformats.org/package/2006/metadata/core-properties"/>
+    <ds:schemaRef ds:uri="http://purl.org/dc/elements/1.1/"/>
+    <ds:schemaRef ds:uri="http://purl.org/dc/terms/"/>
+    <ds:schemaRef ds:uri="http://schemas.microsoft.com/internal/obd"/>
+  </ds:schemaRefs>
+</ds:datastoreItem>
+</file>
+
+<file path=customXml/itemProps3.xml><?xml version="1.0" encoding="utf-8"?>
 <ds:datastoreItem xmlns:ds="http://schemas.openxmlformats.org/officeDocument/2006/customXml" ds:itemID="{3067B86F-F5BB-4BE6-9A37-0E19E53CB68B}">
   <ds:schemaRefs>
     <ds:schemaRef ds:uri="04457b0b-0490-4995-8f27-e0b7141e5786"/>
@@ -27819,18 +26422,8 @@
     <ds:schemaRef ds:uri="http://schemas.openxmlformats.org/package/2006/metadata/core-properties"/>
     <ds:schemaRef ds:uri="http://www.w3.org/XML/1998/namespace"/>
     <ds:schemaRef ds:uri="c152f6e4-8646-42a0-bdef-6957e39d6540"/>
+    <ds:schemaRef ds:uri="bd38d267-56bb-4e22-b975-199a06fd69fa"/>
+    <ds:schemaRef ds:uri="d8c712e5-67fc-4595-93cb-a4164dd8eff3"/>
   </ds:schemaRefs>
 </ds:datastoreItem>
-</file>
-
-<file path=customXml/itemProps2.xml><?xml version="1.0" encoding="utf-8"?>
-<ds:datastoreItem xmlns:ds="http://schemas.openxmlformats.org/officeDocument/2006/customXml" ds:itemID="{98D9791E-52D0-4ABB-925A-4EAECF798D9B}">
-  <ds:schemaRefs>
-    <ds:schemaRef ds:uri="http://schemas.microsoft.com/sharepoint/v3/contenttype/forms"/>
-  </ds:schemaRefs>
-</ds:datastoreItem>
-</file>
-
-<file path=customXml/itemProps3.xml><?xml version="1.0" encoding="utf-8"?>
-<ds:datastoreItem xmlns:ds="http://schemas.openxmlformats.org/officeDocument/2006/customXml" ds:itemID="{C14D352B-E5BB-4807-96CD-F68A176C35D6}"/>
 </file>
</xml_diff>

<commit_message>
Update Learning Log -  Y1C_2022-23_ADSAI.pptx
</commit_message>
<xml_diff>
--- a/docs/Year1/BlockC/MS Teams Assignment Template/Learning Log -  Y1C_2022-23_ADSAI.pptx
+++ b/docs/Year1/BlockC/MS Teams Assignment Template/Learning Log -  Y1C_2022-23_ADSAI.pptx
@@ -18932,7 +18932,7 @@
             </a:pPr>
             <a:r>
               <a:rPr lang="en-US" dirty="0"/>
-              <a:t>The student is able to generate an idea for an application and identifies a  target market in need of this product as well as  evaluate this idea using a Strengths, Weaknesses, Opportunities and Threats (S.W.O.T.) analysis. </a:t>
+              <a:t>The student is able to generate an idea for an application and identifies a  target market in need of this product as well as evaluate this idea based on potential disruptive technology risks and the AI canvas.</a:t>
             </a:r>
             <a:endParaRPr lang="en" dirty="0"/>
           </a:p>
@@ -19245,7 +19245,7 @@
             </a:pPr>
             <a:r>
               <a:rPr lang="en-US" dirty="0"/>
-              <a:t>The student is able to generate an idea for an application and identifies a  target market in need of this product as well as  evaluate this idea using a Strengths, Weaknesses, Opportunities and Threats (S.W.O.T.) analysis. </a:t>
+              <a:t>The student is able to generate an idea for an application and identifies a  target market in need of this product as well as evaluate this idea based on potential disruptive technology risks and the AI canvas.</a:t>
             </a:r>
             <a:endParaRPr lang="en-GB" dirty="0"/>
           </a:p>
@@ -19333,7 +19333,7 @@
             </a:pPr>
             <a:r>
               <a:rPr lang="en-US" dirty="0"/>
-              <a:t>The student is able to generate an idea for an application and identifies a  target market in need of this product as well as  evaluate this idea using a Strengths, Weaknesses, Opportunities and Threats (S.W.O.T.) analysis. </a:t>
+              <a:t>The student is able to generate an idea for an application and identifies a  target market in need of this product as well as evaluate this idea based on potential disruptive technology risks and the AI canvas.</a:t>
             </a:r>
             <a:endParaRPr lang="en-GB" dirty="0"/>
           </a:p>
@@ -26120,15 +26120,6 @@
 </file>
 
 <file path=customXml/item1.xml><?xml version="1.0" encoding="utf-8"?>
-<?mso-contentType ?>
-<FormTemplates xmlns="http://schemas.microsoft.com/sharepoint/v3/contenttype/forms">
-  <Display>DocumentLibraryForm</Display>
-  <Edit>DocumentLibraryForm</Edit>
-  <New>DocumentLibraryForm</New>
-</FormTemplates>
-</file>
-
-<file path=customXml/item2.xml><?xml version="1.0" encoding="utf-8"?>
 <ct:contentTypeSchema xmlns:ct="http://schemas.microsoft.com/office/2006/metadata/contentType" xmlns:ma="http://schemas.microsoft.com/office/2006/metadata/properties/metaAttributes" ct:_="" ma:_="" ma:contentTypeName="Document" ma:contentTypeID="0x01010064DEF28CA2629948A9F801C782641252" ma:contentTypeVersion="16" ma:contentTypeDescription="Create a new document." ma:contentTypeScope="" ma:versionID="9c6005e7f719c391f8a081f21693d65f">
   <xsd:schema xmlns:xsd="http://www.w3.org/2001/XMLSchema" xmlns:xs="http://www.w3.org/2001/XMLSchema" xmlns:p="http://schemas.microsoft.com/office/2006/metadata/properties" xmlns:ns2="bd38d267-56bb-4e22-b975-199a06fd69fa" xmlns:ns3="d8c712e5-67fc-4595-93cb-a4164dd8eff3" targetNamespace="http://schemas.microsoft.com/office/2006/metadata/properties" ma:root="true" ma:fieldsID="ac16135cc8f915f339c57eb2d0574bad" ns2:_="" ns3:_="">
     <xsd:import namespace="bd38d267-56bb-4e22-b975-199a06fd69fa"/>
@@ -26371,7 +26362,7 @@
 </ct:contentTypeSchema>
 </file>
 
-<file path=customXml/item3.xml><?xml version="1.0" encoding="utf-8"?>
+<file path=customXml/item2.xml><?xml version="1.0" encoding="utf-8"?>
 <p:properties xmlns:p="http://schemas.microsoft.com/office/2006/metadata/properties" xmlns:xsi="http://www.w3.org/2001/XMLSchema-instance" xmlns:pc="http://schemas.microsoft.com/office/infopath/2007/PartnerControls">
   <documentManagement>
     <lcf76f155ced4ddcb4097134ff3c332f xmlns="bd38d267-56bb-4e22-b975-199a06fd69fa">
@@ -26382,15 +26373,16 @@
 </p:properties>
 </file>
 
-<file path=customXml/itemProps1.xml><?xml version="1.0" encoding="utf-8"?>
-<ds:datastoreItem xmlns:ds="http://schemas.openxmlformats.org/officeDocument/2006/customXml" ds:itemID="{98D9791E-52D0-4ABB-925A-4EAECF798D9B}">
-  <ds:schemaRefs>
-    <ds:schemaRef ds:uri="http://schemas.microsoft.com/sharepoint/v3/contenttype/forms"/>
-  </ds:schemaRefs>
-</ds:datastoreItem>
+<file path=customXml/item3.xml><?xml version="1.0" encoding="utf-8"?>
+<?mso-contentType ?>
+<FormTemplates xmlns="http://schemas.microsoft.com/sharepoint/v3/contenttype/forms">
+  <Display>DocumentLibraryForm</Display>
+  <Edit>DocumentLibraryForm</Edit>
+  <New>DocumentLibraryForm</New>
+</FormTemplates>
 </file>
 
-<file path=customXml/itemProps2.xml><?xml version="1.0" encoding="utf-8"?>
+<file path=customXml/itemProps1.xml><?xml version="1.0" encoding="utf-8"?>
 <ds:datastoreItem xmlns:ds="http://schemas.openxmlformats.org/officeDocument/2006/customXml" ds:itemID="{C14D352B-E5BB-4807-96CD-F68A176C35D6}">
   <ds:schemaRefs>
     <ds:schemaRef ds:uri="http://schemas.microsoft.com/office/2006/metadata/contentType"/>
@@ -26409,7 +26401,7 @@
 </ds:datastoreItem>
 </file>
 
-<file path=customXml/itemProps3.xml><?xml version="1.0" encoding="utf-8"?>
+<file path=customXml/itemProps2.xml><?xml version="1.0" encoding="utf-8"?>
 <ds:datastoreItem xmlns:ds="http://schemas.openxmlformats.org/officeDocument/2006/customXml" ds:itemID="{3067B86F-F5BB-4BE6-9A37-0E19E53CB68B}">
   <ds:schemaRefs>
     <ds:schemaRef ds:uri="04457b0b-0490-4995-8f27-e0b7141e5786"/>
@@ -26426,4 +26418,12 @@
     <ds:schemaRef ds:uri="d8c712e5-67fc-4595-93cb-a4164dd8eff3"/>
   </ds:schemaRefs>
 </ds:datastoreItem>
+</file>
+
+<file path=customXml/itemProps3.xml><?xml version="1.0" encoding="utf-8"?>
+<ds:datastoreItem xmlns:ds="http://schemas.openxmlformats.org/officeDocument/2006/customXml" ds:itemID="{98D9791E-52D0-4ABB-925A-4EAECF798D9B}">
+  <ds:schemaRefs>
+    <ds:schemaRef ds:uri="http://schemas.microsoft.com/sharepoint/v3/contenttype/forms"/>
+  </ds:schemaRefs>
+</ds:datastoreItem>
 </file>
</xml_diff>